<commit_message>
wrote presentation with napoleon
</commit_message>
<xml_diff>
--- a/report/Presentation.pptx
+++ b/report/Presentation.pptx
@@ -5,7 +5,7 @@
     <p:sldMasterId id="2147483660" r:id="rId1"/>
   </p:sldMasterIdLst>
   <p:notesMasterIdLst>
-    <p:notesMasterId r:id="rId10"/>
+    <p:notesMasterId r:id="rId11"/>
   </p:notesMasterIdLst>
   <p:sldIdLst>
     <p:sldId id="256" r:id="rId2"/>
@@ -14,8 +14,9 @@
     <p:sldId id="266" r:id="rId5"/>
     <p:sldId id="261" r:id="rId6"/>
     <p:sldId id="262" r:id="rId7"/>
-    <p:sldId id="263" r:id="rId8"/>
-    <p:sldId id="264" r:id="rId9"/>
+    <p:sldId id="267" r:id="rId8"/>
+    <p:sldId id="263" r:id="rId9"/>
+    <p:sldId id="264" r:id="rId10"/>
   </p:sldIdLst>
   <p:sldSz cx="12192000" cy="6858000"/>
   <p:notesSz cx="6858000" cy="9144000"/>
@@ -204,7 +205,7 @@
           <a:p>
             <a:fld id="{0B5FF9F3-B8F7-44D8-B55E-59E955E4F250}" type="datetimeFigureOut">
               <a:rPr lang="en-GB" smtClean="0"/>
-              <a:t>03/05/2016</a:t>
+              <a:t>08/05/2016</a:t>
             </a:fld>
             <a:endParaRPr lang="en-GB"/>
           </a:p>
@@ -268,35 +269,35 @@
           <a:p>
             <a:pPr lvl="0"/>
             <a:r>
-              <a:rPr lang="en-US" smtClean="0"/>
+              <a:rPr lang="en-US"/>
               <a:t>Click to edit Master text styles</a:t>
             </a:r>
           </a:p>
           <a:p>
             <a:pPr lvl="1"/>
             <a:r>
-              <a:rPr lang="en-US" smtClean="0"/>
+              <a:rPr lang="en-US"/>
               <a:t>Second level</a:t>
             </a:r>
           </a:p>
           <a:p>
             <a:pPr lvl="2"/>
             <a:r>
-              <a:rPr lang="en-US" smtClean="0"/>
+              <a:rPr lang="en-US"/>
               <a:t>Third level</a:t>
             </a:r>
           </a:p>
           <a:p>
             <a:pPr lvl="3"/>
             <a:r>
-              <a:rPr lang="en-US" smtClean="0"/>
+              <a:rPr lang="en-US"/>
               <a:t>Fourth level</a:t>
             </a:r>
           </a:p>
           <a:p>
             <a:pPr lvl="4"/>
             <a:r>
-              <a:rPr lang="en-US" smtClean="0"/>
+              <a:rPr lang="en-US"/>
               <a:t>Fifth level</a:t>
             </a:r>
             <a:endParaRPr lang="en-GB"/>
@@ -516,21 +517,7 @@
           <a:bodyPr/>
           <a:lstStyle/>
           <a:p>
-            <a:r>
-              <a:rPr lang="en-GB" dirty="0" smtClean="0"/>
-              <a:t>Original idea was that</a:t>
-            </a:r>
-            <a:r>
-              <a:rPr lang="en-GB" baseline="0" dirty="0" smtClean="0"/>
-              <a:t> current crime visualisations only report historic data and we thought there was a good opportunity to add some analysis to that.</a:t>
-            </a:r>
-          </a:p>
-          <a:p>
-            <a:r>
-              <a:rPr lang="en-GB" baseline="0" dirty="0" smtClean="0"/>
-              <a:t>	- We were quite ignorant of the data, the reason why </a:t>
-            </a:r>
-            <a:endParaRPr lang="en-GB" dirty="0"/>
+            <a:endParaRPr lang="en-US"/>
           </a:p>
         </p:txBody>
       </p:sp>
@@ -551,7 +538,7 @@
           <a:p>
             <a:fld id="{DD801837-D9B4-4140-8B18-11EA6BF1B100}" type="slidenum">
               <a:rPr lang="en-GB" smtClean="0"/>
-              <a:t>4</a:t>
+              <a:t>‹#›</a:t>
             </a:fld>
             <a:endParaRPr lang="en-GB"/>
           </a:p>
@@ -560,7 +547,7 @@
     </p:spTree>
     <p:extLst>
       <p:ext uri="{BB962C8B-B14F-4D97-AF65-F5344CB8AC3E}">
-        <p14:creationId xmlns:p14="http://schemas.microsoft.com/office/powerpoint/2010/main" val="2472139083"/>
+        <p14:creationId xmlns:p14="http://schemas.microsoft.com/office/powerpoint/2010/main" val="15185861"/>
       </p:ext>
     </p:extLst>
   </p:cSld>
@@ -614,18 +601,516 @@
           <a:bodyPr/>
           <a:lstStyle/>
           <a:p>
-            <a:r>
-              <a:rPr lang="en-GB" dirty="0" smtClean="0"/>
-              <a:t>Comment on its exploratory nature.</a:t>
-            </a:r>
-            <a:r>
-              <a:rPr lang="en-GB" baseline="0" dirty="0" smtClean="0"/>
-              <a:t> All these types of people can use the app and may gain something from it but it isn’t projecting a single message to </a:t>
-            </a:r>
-            <a:r>
-              <a:rPr lang="en-GB" baseline="0" smtClean="0"/>
-              <a:t>a single type of person. </a:t>
-            </a:r>
+            <a:endParaRPr lang="en-US"/>
+          </a:p>
+        </p:txBody>
+      </p:sp>
+      <p:sp>
+        <p:nvSpPr>
+          <p:cNvPr id="4" name="Slide Number Placeholder 3"/>
+          <p:cNvSpPr>
+            <a:spLocks noGrp="1"/>
+          </p:cNvSpPr>
+          <p:nvPr>
+            <p:ph type="sldNum" sz="quarter" idx="10"/>
+          </p:nvPr>
+        </p:nvSpPr>
+        <p:spPr/>
+        <p:txBody>
+          <a:bodyPr/>
+          <a:lstStyle/>
+          <a:p>
+            <a:fld id="{DD801837-D9B4-4140-8B18-11EA6BF1B100}" type="slidenum">
+              <a:rPr lang="en-GB" smtClean="0"/>
+              <a:t>‹#›</a:t>
+            </a:fld>
+            <a:endParaRPr lang="en-GB"/>
+          </a:p>
+        </p:txBody>
+      </p:sp>
+    </p:spTree>
+    <p:extLst>
+      <p:ext uri="{BB962C8B-B14F-4D97-AF65-F5344CB8AC3E}">
+        <p14:creationId xmlns:p14="http://schemas.microsoft.com/office/powerpoint/2010/main" val="3357795110"/>
+      </p:ext>
+    </p:extLst>
+  </p:cSld>
+  <p:clrMapOvr>
+    <a:masterClrMapping/>
+  </p:clrMapOvr>
+</p:notes>
+</file>
+
+<file path=ppt/notesSlides/notesSlide3.xml><?xml version="1.0" encoding="utf-8"?>
+<p:notes xmlns:a="http://schemas.openxmlformats.org/drawingml/2006/main" xmlns:r="http://schemas.openxmlformats.org/officeDocument/2006/relationships" xmlns:p="http://schemas.openxmlformats.org/presentationml/2006/main">
+  <p:cSld>
+    <p:spTree>
+      <p:nvGrpSpPr>
+        <p:cNvPr id="1" name=""/>
+        <p:cNvGrpSpPr/>
+        <p:nvPr/>
+      </p:nvGrpSpPr>
+      <p:grpSpPr>
+        <a:xfrm>
+          <a:off x="0" y="0"/>
+          <a:ext cx="0" cy="0"/>
+          <a:chOff x="0" y="0"/>
+          <a:chExt cx="0" cy="0"/>
+        </a:xfrm>
+      </p:grpSpPr>
+      <p:sp>
+        <p:nvSpPr>
+          <p:cNvPr id="2" name="Slide Image Placeholder 1"/>
+          <p:cNvSpPr>
+            <a:spLocks noGrp="1" noRot="1" noChangeAspect="1"/>
+          </p:cNvSpPr>
+          <p:nvPr>
+            <p:ph type="sldImg"/>
+          </p:nvPr>
+        </p:nvSpPr>
+        <p:spPr/>
+      </p:sp>
+      <p:sp>
+        <p:nvSpPr>
+          <p:cNvPr id="3" name="Notes Placeholder 2"/>
+          <p:cNvSpPr>
+            <a:spLocks noGrp="1"/>
+          </p:cNvSpPr>
+          <p:nvPr>
+            <p:ph type="body" idx="1"/>
+          </p:nvPr>
+        </p:nvSpPr>
+        <p:spPr/>
+        <p:txBody>
+          <a:bodyPr/>
+          <a:lstStyle/>
+          <a:p>
+            <a:endParaRPr lang="en-US"/>
+          </a:p>
+        </p:txBody>
+      </p:sp>
+      <p:sp>
+        <p:nvSpPr>
+          <p:cNvPr id="4" name="Slide Number Placeholder 3"/>
+          <p:cNvSpPr>
+            <a:spLocks noGrp="1"/>
+          </p:cNvSpPr>
+          <p:nvPr>
+            <p:ph type="sldNum" sz="quarter" idx="10"/>
+          </p:nvPr>
+        </p:nvSpPr>
+        <p:spPr/>
+        <p:txBody>
+          <a:bodyPr/>
+          <a:lstStyle/>
+          <a:p>
+            <a:fld id="{DD801837-D9B4-4140-8B18-11EA6BF1B100}" type="slidenum">
+              <a:rPr lang="en-GB" smtClean="0"/>
+              <a:t>‹#›</a:t>
+            </a:fld>
+            <a:endParaRPr lang="en-GB"/>
+          </a:p>
+        </p:txBody>
+      </p:sp>
+    </p:spTree>
+    <p:extLst>
+      <p:ext uri="{BB962C8B-B14F-4D97-AF65-F5344CB8AC3E}">
+        <p14:creationId xmlns:p14="http://schemas.microsoft.com/office/powerpoint/2010/main" val="3300007904"/>
+      </p:ext>
+    </p:extLst>
+  </p:cSld>
+  <p:clrMapOvr>
+    <a:masterClrMapping/>
+  </p:clrMapOvr>
+</p:notes>
+</file>
+
+<file path=ppt/notesSlides/notesSlide4.xml><?xml version="1.0" encoding="utf-8"?>
+<p:notes xmlns:a="http://schemas.openxmlformats.org/drawingml/2006/main" xmlns:r="http://schemas.openxmlformats.org/officeDocument/2006/relationships" xmlns:p="http://schemas.openxmlformats.org/presentationml/2006/main">
+  <p:cSld>
+    <p:spTree>
+      <p:nvGrpSpPr>
+        <p:cNvPr id="1" name=""/>
+        <p:cNvGrpSpPr/>
+        <p:nvPr/>
+      </p:nvGrpSpPr>
+      <p:grpSpPr>
+        <a:xfrm>
+          <a:off x="0" y="0"/>
+          <a:ext cx="0" cy="0"/>
+          <a:chOff x="0" y="0"/>
+          <a:chExt cx="0" cy="0"/>
+        </a:xfrm>
+      </p:grpSpPr>
+      <p:sp>
+        <p:nvSpPr>
+          <p:cNvPr id="2" name="Slide Image Placeholder 1"/>
+          <p:cNvSpPr>
+            <a:spLocks noGrp="1" noRot="1" noChangeAspect="1"/>
+          </p:cNvSpPr>
+          <p:nvPr>
+            <p:ph type="sldImg"/>
+          </p:nvPr>
+        </p:nvSpPr>
+        <p:spPr/>
+      </p:sp>
+      <p:sp>
+        <p:nvSpPr>
+          <p:cNvPr id="3" name="Notes Placeholder 2"/>
+          <p:cNvSpPr>
+            <a:spLocks noGrp="1"/>
+          </p:cNvSpPr>
+          <p:nvPr>
+            <p:ph type="body" idx="1"/>
+          </p:nvPr>
+        </p:nvSpPr>
+        <p:spPr/>
+        <p:txBody>
+          <a:bodyPr/>
+          <a:lstStyle/>
+          <a:p>
+            <a:br>
+              <a:rPr lang="en-GB" dirty="0"/>
+            </a:br>
+            <a:endParaRPr lang="en-GB" dirty="0"/>
+          </a:p>
+        </p:txBody>
+      </p:sp>
+      <p:sp>
+        <p:nvSpPr>
+          <p:cNvPr id="4" name="Slide Number Placeholder 3"/>
+          <p:cNvSpPr>
+            <a:spLocks noGrp="1"/>
+          </p:cNvSpPr>
+          <p:nvPr>
+            <p:ph type="sldNum" sz="quarter" idx="10"/>
+          </p:nvPr>
+        </p:nvSpPr>
+        <p:spPr/>
+        <p:txBody>
+          <a:bodyPr/>
+          <a:lstStyle/>
+          <a:p>
+            <a:fld id="{DD801837-D9B4-4140-8B18-11EA6BF1B100}" type="slidenum">
+              <a:rPr lang="en-GB" smtClean="0"/>
+              <a:t>4</a:t>
+            </a:fld>
+            <a:endParaRPr lang="en-GB"/>
+          </a:p>
+        </p:txBody>
+      </p:sp>
+    </p:spTree>
+    <p:extLst>
+      <p:ext uri="{BB962C8B-B14F-4D97-AF65-F5344CB8AC3E}">
+        <p14:creationId xmlns:p14="http://schemas.microsoft.com/office/powerpoint/2010/main" val="2472139083"/>
+      </p:ext>
+    </p:extLst>
+  </p:cSld>
+  <p:clrMapOvr>
+    <a:masterClrMapping/>
+  </p:clrMapOvr>
+</p:notes>
+</file>
+
+<file path=ppt/notesSlides/notesSlide5.xml><?xml version="1.0" encoding="utf-8"?>
+<p:notes xmlns:a="http://schemas.openxmlformats.org/drawingml/2006/main" xmlns:r="http://schemas.openxmlformats.org/officeDocument/2006/relationships" xmlns:p="http://schemas.openxmlformats.org/presentationml/2006/main">
+  <p:cSld>
+    <p:spTree>
+      <p:nvGrpSpPr>
+        <p:cNvPr id="1" name=""/>
+        <p:cNvGrpSpPr/>
+        <p:nvPr/>
+      </p:nvGrpSpPr>
+      <p:grpSpPr>
+        <a:xfrm>
+          <a:off x="0" y="0"/>
+          <a:ext cx="0" cy="0"/>
+          <a:chOff x="0" y="0"/>
+          <a:chExt cx="0" cy="0"/>
+        </a:xfrm>
+      </p:grpSpPr>
+      <p:sp>
+        <p:nvSpPr>
+          <p:cNvPr id="2" name="Slide Image Placeholder 1"/>
+          <p:cNvSpPr>
+            <a:spLocks noGrp="1" noRot="1" noChangeAspect="1"/>
+          </p:cNvSpPr>
+          <p:nvPr>
+            <p:ph type="sldImg"/>
+          </p:nvPr>
+        </p:nvSpPr>
+        <p:spPr/>
+      </p:sp>
+      <p:sp>
+        <p:nvSpPr>
+          <p:cNvPr id="3" name="Notes Placeholder 2"/>
+          <p:cNvSpPr>
+            <a:spLocks noGrp="1"/>
+          </p:cNvSpPr>
+          <p:nvPr>
+            <p:ph type="body" idx="1"/>
+          </p:nvPr>
+        </p:nvSpPr>
+        <p:spPr/>
+        <p:txBody>
+          <a:bodyPr/>
+          <a:lstStyle/>
+          <a:p>
+            <a:endParaRPr lang="en-US"/>
+          </a:p>
+        </p:txBody>
+      </p:sp>
+      <p:sp>
+        <p:nvSpPr>
+          <p:cNvPr id="4" name="Slide Number Placeholder 3"/>
+          <p:cNvSpPr>
+            <a:spLocks noGrp="1"/>
+          </p:cNvSpPr>
+          <p:nvPr>
+            <p:ph type="sldNum" sz="quarter" idx="10"/>
+          </p:nvPr>
+        </p:nvSpPr>
+        <p:spPr/>
+        <p:txBody>
+          <a:bodyPr/>
+          <a:lstStyle/>
+          <a:p>
+            <a:fld id="{DD801837-D9B4-4140-8B18-11EA6BF1B100}" type="slidenum">
+              <a:rPr lang="en-GB" smtClean="0"/>
+              <a:t>‹#›</a:t>
+            </a:fld>
+            <a:endParaRPr lang="en-GB"/>
+          </a:p>
+        </p:txBody>
+      </p:sp>
+    </p:spTree>
+    <p:extLst>
+      <p:ext uri="{BB962C8B-B14F-4D97-AF65-F5344CB8AC3E}">
+        <p14:creationId xmlns:p14="http://schemas.microsoft.com/office/powerpoint/2010/main" val="4263317220"/>
+      </p:ext>
+    </p:extLst>
+  </p:cSld>
+  <p:clrMapOvr>
+    <a:masterClrMapping/>
+  </p:clrMapOvr>
+</p:notes>
+</file>
+
+<file path=ppt/notesSlides/notesSlide6.xml><?xml version="1.0" encoding="utf-8"?>
+<p:notes xmlns:a="http://schemas.openxmlformats.org/drawingml/2006/main" xmlns:r="http://schemas.openxmlformats.org/officeDocument/2006/relationships" xmlns:p="http://schemas.openxmlformats.org/presentationml/2006/main">
+  <p:cSld>
+    <p:spTree>
+      <p:nvGrpSpPr>
+        <p:cNvPr id="1" name=""/>
+        <p:cNvGrpSpPr/>
+        <p:nvPr/>
+      </p:nvGrpSpPr>
+      <p:grpSpPr>
+        <a:xfrm>
+          <a:off x="0" y="0"/>
+          <a:ext cx="0" cy="0"/>
+          <a:chOff x="0" y="0"/>
+          <a:chExt cx="0" cy="0"/>
+        </a:xfrm>
+      </p:grpSpPr>
+      <p:sp>
+        <p:nvSpPr>
+          <p:cNvPr id="2" name="Slide Image Placeholder 1"/>
+          <p:cNvSpPr>
+            <a:spLocks noGrp="1" noRot="1" noChangeAspect="1"/>
+          </p:cNvSpPr>
+          <p:nvPr>
+            <p:ph type="sldImg"/>
+          </p:nvPr>
+        </p:nvSpPr>
+        <p:spPr/>
+      </p:sp>
+      <p:sp>
+        <p:nvSpPr>
+          <p:cNvPr id="3" name="Notes Placeholder 2"/>
+          <p:cNvSpPr>
+            <a:spLocks noGrp="1"/>
+          </p:cNvSpPr>
+          <p:nvPr>
+            <p:ph type="body" idx="1"/>
+          </p:nvPr>
+        </p:nvSpPr>
+        <p:spPr/>
+        <p:txBody>
+          <a:bodyPr/>
+          <a:lstStyle/>
+          <a:p>
+            <a:endParaRPr lang="en-US"/>
+          </a:p>
+        </p:txBody>
+      </p:sp>
+      <p:sp>
+        <p:nvSpPr>
+          <p:cNvPr id="4" name="Slide Number Placeholder 3"/>
+          <p:cNvSpPr>
+            <a:spLocks noGrp="1"/>
+          </p:cNvSpPr>
+          <p:nvPr>
+            <p:ph type="sldNum" sz="quarter" idx="10"/>
+          </p:nvPr>
+        </p:nvSpPr>
+        <p:spPr/>
+        <p:txBody>
+          <a:bodyPr/>
+          <a:lstStyle/>
+          <a:p>
+            <a:fld id="{DD801837-D9B4-4140-8B18-11EA6BF1B100}" type="slidenum">
+              <a:rPr lang="en-GB" smtClean="0"/>
+              <a:t>‹#›</a:t>
+            </a:fld>
+            <a:endParaRPr lang="en-GB"/>
+          </a:p>
+        </p:txBody>
+      </p:sp>
+    </p:spTree>
+    <p:extLst>
+      <p:ext uri="{BB962C8B-B14F-4D97-AF65-F5344CB8AC3E}">
+        <p14:creationId xmlns:p14="http://schemas.microsoft.com/office/powerpoint/2010/main" val="574545904"/>
+      </p:ext>
+    </p:extLst>
+  </p:cSld>
+  <p:clrMapOvr>
+    <a:masterClrMapping/>
+  </p:clrMapOvr>
+</p:notes>
+</file>
+
+<file path=ppt/notesSlides/notesSlide7.xml><?xml version="1.0" encoding="utf-8"?>
+<p:notes xmlns:a="http://schemas.openxmlformats.org/drawingml/2006/main" xmlns:r="http://schemas.openxmlformats.org/officeDocument/2006/relationships" xmlns:p="http://schemas.openxmlformats.org/presentationml/2006/main">
+  <p:cSld>
+    <p:spTree>
+      <p:nvGrpSpPr>
+        <p:cNvPr id="1" name=""/>
+        <p:cNvGrpSpPr/>
+        <p:nvPr/>
+      </p:nvGrpSpPr>
+      <p:grpSpPr>
+        <a:xfrm>
+          <a:off x="0" y="0"/>
+          <a:ext cx="0" cy="0"/>
+          <a:chOff x="0" y="0"/>
+          <a:chExt cx="0" cy="0"/>
+        </a:xfrm>
+      </p:grpSpPr>
+      <p:sp>
+        <p:nvSpPr>
+          <p:cNvPr id="2" name="Slide Image Placeholder 1"/>
+          <p:cNvSpPr>
+            <a:spLocks noGrp="1" noRot="1" noChangeAspect="1"/>
+          </p:cNvSpPr>
+          <p:nvPr>
+            <p:ph type="sldImg"/>
+          </p:nvPr>
+        </p:nvSpPr>
+        <p:spPr/>
+      </p:sp>
+      <p:sp>
+        <p:nvSpPr>
+          <p:cNvPr id="3" name="Notes Placeholder 2"/>
+          <p:cNvSpPr>
+            <a:spLocks noGrp="1"/>
+          </p:cNvSpPr>
+          <p:nvPr>
+            <p:ph type="body" idx="1"/>
+          </p:nvPr>
+        </p:nvSpPr>
+        <p:spPr/>
+        <p:txBody>
+          <a:bodyPr/>
+          <a:lstStyle/>
+          <a:p>
+            <a:endParaRPr lang="en-US"/>
+          </a:p>
+        </p:txBody>
+      </p:sp>
+      <p:sp>
+        <p:nvSpPr>
+          <p:cNvPr id="4" name="Slide Number Placeholder 3"/>
+          <p:cNvSpPr>
+            <a:spLocks noGrp="1"/>
+          </p:cNvSpPr>
+          <p:nvPr>
+            <p:ph type="sldNum" sz="quarter" idx="10"/>
+          </p:nvPr>
+        </p:nvSpPr>
+        <p:spPr/>
+        <p:txBody>
+          <a:bodyPr/>
+          <a:lstStyle/>
+          <a:p>
+            <a:fld id="{DD801837-D9B4-4140-8B18-11EA6BF1B100}" type="slidenum">
+              <a:rPr lang="en-GB" smtClean="0"/>
+              <a:t>‹#›</a:t>
+            </a:fld>
+            <a:endParaRPr lang="en-GB"/>
+          </a:p>
+        </p:txBody>
+      </p:sp>
+    </p:spTree>
+    <p:extLst>
+      <p:ext uri="{BB962C8B-B14F-4D97-AF65-F5344CB8AC3E}">
+        <p14:creationId xmlns:p14="http://schemas.microsoft.com/office/powerpoint/2010/main" val="3691600722"/>
+      </p:ext>
+    </p:extLst>
+  </p:cSld>
+  <p:clrMapOvr>
+    <a:masterClrMapping/>
+  </p:clrMapOvr>
+</p:notes>
+</file>
+
+<file path=ppt/notesSlides/notesSlide8.xml><?xml version="1.0" encoding="utf-8"?>
+<p:notes xmlns:a="http://schemas.openxmlformats.org/drawingml/2006/main" xmlns:r="http://schemas.openxmlformats.org/officeDocument/2006/relationships" xmlns:p="http://schemas.openxmlformats.org/presentationml/2006/main">
+  <p:cSld>
+    <p:spTree>
+      <p:nvGrpSpPr>
+        <p:cNvPr id="1" name=""/>
+        <p:cNvGrpSpPr/>
+        <p:nvPr/>
+      </p:nvGrpSpPr>
+      <p:grpSpPr>
+        <a:xfrm>
+          <a:off x="0" y="0"/>
+          <a:ext cx="0" cy="0"/>
+          <a:chOff x="0" y="0"/>
+          <a:chExt cx="0" cy="0"/>
+        </a:xfrm>
+      </p:grpSpPr>
+      <p:sp>
+        <p:nvSpPr>
+          <p:cNvPr id="2" name="Slide Image Placeholder 1"/>
+          <p:cNvSpPr>
+            <a:spLocks noGrp="1" noRot="1" noChangeAspect="1"/>
+          </p:cNvSpPr>
+          <p:nvPr>
+            <p:ph type="sldImg"/>
+          </p:nvPr>
+        </p:nvSpPr>
+        <p:spPr/>
+      </p:sp>
+      <p:sp>
+        <p:nvSpPr>
+          <p:cNvPr id="3" name="Notes Placeholder 2"/>
+          <p:cNvSpPr>
+            <a:spLocks noGrp="1"/>
+          </p:cNvSpPr>
+          <p:nvPr>
+            <p:ph type="body" idx="1"/>
+          </p:nvPr>
+        </p:nvSpPr>
+        <p:spPr/>
+        <p:txBody>
+          <a:bodyPr/>
+          <a:lstStyle/>
+          <a:p>
+            <a:br>
+              <a:rPr lang="en-GB" dirty="0"/>
+            </a:br>
             <a:endParaRPr lang="en-GB"/>
           </a:p>
         </p:txBody>
@@ -657,6 +1142,90 @@
     <p:extLst>
       <p:ext uri="{BB962C8B-B14F-4D97-AF65-F5344CB8AC3E}">
         <p14:creationId xmlns:p14="http://schemas.microsoft.com/office/powerpoint/2010/main" val="446436855"/>
+      </p:ext>
+    </p:extLst>
+  </p:cSld>
+  <p:clrMapOvr>
+    <a:masterClrMapping/>
+  </p:clrMapOvr>
+</p:notes>
+</file>
+
+<file path=ppt/notesSlides/notesSlide9.xml><?xml version="1.0" encoding="utf-8"?>
+<p:notes xmlns:a="http://schemas.openxmlformats.org/drawingml/2006/main" xmlns:r="http://schemas.openxmlformats.org/officeDocument/2006/relationships" xmlns:p="http://schemas.openxmlformats.org/presentationml/2006/main">
+  <p:cSld>
+    <p:spTree>
+      <p:nvGrpSpPr>
+        <p:cNvPr id="1" name=""/>
+        <p:cNvGrpSpPr/>
+        <p:nvPr/>
+      </p:nvGrpSpPr>
+      <p:grpSpPr>
+        <a:xfrm>
+          <a:off x="0" y="0"/>
+          <a:ext cx="0" cy="0"/>
+          <a:chOff x="0" y="0"/>
+          <a:chExt cx="0" cy="0"/>
+        </a:xfrm>
+      </p:grpSpPr>
+      <p:sp>
+        <p:nvSpPr>
+          <p:cNvPr id="2" name="Slide Image Placeholder 1"/>
+          <p:cNvSpPr>
+            <a:spLocks noGrp="1" noRot="1" noChangeAspect="1"/>
+          </p:cNvSpPr>
+          <p:nvPr>
+            <p:ph type="sldImg"/>
+          </p:nvPr>
+        </p:nvSpPr>
+        <p:spPr/>
+      </p:sp>
+      <p:sp>
+        <p:nvSpPr>
+          <p:cNvPr id="3" name="Notes Placeholder 2"/>
+          <p:cNvSpPr>
+            <a:spLocks noGrp="1"/>
+          </p:cNvSpPr>
+          <p:nvPr>
+            <p:ph type="body" idx="1"/>
+          </p:nvPr>
+        </p:nvSpPr>
+        <p:spPr/>
+        <p:txBody>
+          <a:bodyPr/>
+          <a:lstStyle/>
+          <a:p>
+            <a:endParaRPr lang="en-US"/>
+          </a:p>
+        </p:txBody>
+      </p:sp>
+      <p:sp>
+        <p:nvSpPr>
+          <p:cNvPr id="4" name="Slide Number Placeholder 3"/>
+          <p:cNvSpPr>
+            <a:spLocks noGrp="1"/>
+          </p:cNvSpPr>
+          <p:nvPr>
+            <p:ph type="sldNum" sz="quarter" idx="10"/>
+          </p:nvPr>
+        </p:nvSpPr>
+        <p:spPr/>
+        <p:txBody>
+          <a:bodyPr/>
+          <a:lstStyle/>
+          <a:p>
+            <a:fld id="{DD801837-D9B4-4140-8B18-11EA6BF1B100}" type="slidenum">
+              <a:rPr lang="en-GB" smtClean="0"/>
+              <a:t>‹#›</a:t>
+            </a:fld>
+            <a:endParaRPr lang="en-GB"/>
+          </a:p>
+        </p:txBody>
+      </p:sp>
+    </p:spTree>
+    <p:extLst>
+      <p:ext uri="{BB962C8B-B14F-4D97-AF65-F5344CB8AC3E}">
+        <p14:creationId xmlns:p14="http://schemas.microsoft.com/office/powerpoint/2010/main" val="1399159380"/>
       </p:ext>
     </p:extLst>
   </p:cSld>
@@ -725,7 +1294,7 @@
           </a:lstStyle>
           <a:p>
             <a:r>
-              <a:rPr lang="en-US" smtClean="0"/>
+              <a:rPr lang="en-US"/>
               <a:t>Click to edit Master title style</a:t>
             </a:r>
             <a:endParaRPr lang="en-US" dirty="0"/>
@@ -855,7 +1424,7 @@
           </a:lstStyle>
           <a:p>
             <a:r>
-              <a:rPr lang="en-US" smtClean="0"/>
+              <a:rPr lang="en-US"/>
               <a:t>Click to edit Master subtitle style</a:t>
             </a:r>
             <a:endParaRPr lang="en-US" dirty="0"/>
@@ -879,7 +1448,7 @@
           <a:p>
             <a:fld id="{BDDAFA7A-6445-4002-8C74-4055B96B083F}" type="datetimeFigureOut">
               <a:rPr lang="en-US" smtClean="0"/>
-              <a:t>5/3/2016</a:t>
+              <a:t>5/8/2016</a:t>
             </a:fld>
             <a:endParaRPr lang="en-US"/>
           </a:p>
@@ -984,7 +1553,7 @@
           </a:lstStyle>
           <a:p>
             <a:r>
-              <a:rPr lang="en-US" smtClean="0"/>
+              <a:rPr lang="en-US"/>
               <a:t>Click to edit Master title style</a:t>
             </a:r>
             <a:endParaRPr lang="en-US" dirty="0"/>
@@ -1079,7 +1648,7 @@
           </a:lstStyle>
           <a:p>
             <a:r>
-              <a:rPr lang="en-US" smtClean="0"/>
+              <a:rPr lang="en-US"/>
               <a:t>Click icon to add picture</a:t>
             </a:r>
             <a:endParaRPr lang="en-US" dirty="0"/>
@@ -1147,7 +1716,7 @@
           <a:p>
             <a:pPr lvl="0"/>
             <a:r>
-              <a:rPr lang="en-US" smtClean="0"/>
+              <a:rPr lang="en-US"/>
               <a:t>Click to edit Master text styles</a:t>
             </a:r>
           </a:p>
@@ -1170,7 +1739,7 @@
           <a:p>
             <a:fld id="{BDDAFA7A-6445-4002-8C74-4055B96B083F}" type="datetimeFigureOut">
               <a:rPr lang="en-US" smtClean="0"/>
-              <a:t>5/3/2016</a:t>
+              <a:t>5/8/2016</a:t>
             </a:fld>
             <a:endParaRPr lang="en-US"/>
           </a:p>
@@ -1275,7 +1844,7 @@
           </a:lstStyle>
           <a:p>
             <a:r>
-              <a:rPr lang="en-US" smtClean="0"/>
+              <a:rPr lang="en-US"/>
               <a:t>Click to edit Master title style</a:t>
             </a:r>
             <a:endParaRPr lang="en-US" dirty="0"/>
@@ -1406,7 +1975,7 @@
           <a:p>
             <a:pPr lvl="0"/>
             <a:r>
-              <a:rPr lang="en-US" smtClean="0"/>
+              <a:rPr lang="en-US"/>
               <a:t>Click to edit Master text styles</a:t>
             </a:r>
           </a:p>
@@ -1429,7 +1998,7 @@
           <a:p>
             <a:fld id="{BDDAFA7A-6445-4002-8C74-4055B96B083F}" type="datetimeFigureOut">
               <a:rPr lang="en-US" smtClean="0"/>
-              <a:t>5/3/2016</a:t>
+              <a:t>5/8/2016</a:t>
             </a:fld>
             <a:endParaRPr lang="en-US"/>
           </a:p>
@@ -1768,7 +2337,7 @@
           </a:lstStyle>
           <a:p>
             <a:r>
-              <a:rPr lang="en-US" smtClean="0"/>
+              <a:rPr lang="en-US"/>
               <a:t>Click to edit Master title style</a:t>
             </a:r>
             <a:endParaRPr lang="en-US" dirty="0"/>
@@ -1823,7 +2392,7 @@
           <a:p>
             <a:pPr lvl="0"/>
             <a:r>
-              <a:rPr lang="en-US" smtClean="0"/>
+              <a:rPr lang="en-US"/>
               <a:t>Click to edit Master text styles</a:t>
             </a:r>
           </a:p>
@@ -1875,7 +2444,7 @@
               <a:buNone/>
             </a:pPr>
             <a:r>
-              <a:rPr lang="en-US" smtClean="0"/>
+              <a:rPr lang="en-US"/>
               <a:t>Click to edit Master text styles</a:t>
             </a:r>
           </a:p>
@@ -1898,7 +2467,7 @@
           <a:p>
             <a:fld id="{BDDAFA7A-6445-4002-8C74-4055B96B083F}" type="datetimeFigureOut">
               <a:rPr lang="en-US" smtClean="0"/>
-              <a:t>5/3/2016</a:t>
+              <a:t>5/8/2016</a:t>
             </a:fld>
             <a:endParaRPr lang="en-US"/>
           </a:p>
@@ -2003,7 +2572,7 @@
           </a:lstStyle>
           <a:p>
             <a:r>
-              <a:rPr lang="en-US" smtClean="0"/>
+              <a:rPr lang="en-US"/>
               <a:t>Click to edit Master title style</a:t>
             </a:r>
             <a:endParaRPr lang="en-US" dirty="0"/>
@@ -2055,7 +2624,7 @@
               <a:buNone/>
             </a:pPr>
             <a:r>
-              <a:rPr lang="en-US" smtClean="0"/>
+              <a:rPr lang="en-US"/>
               <a:t>Click to edit Master text styles</a:t>
             </a:r>
           </a:p>
@@ -2078,7 +2647,7 @@
           <a:p>
             <a:fld id="{BDDAFA7A-6445-4002-8C74-4055B96B083F}" type="datetimeFigureOut">
               <a:rPr lang="en-US" smtClean="0"/>
-              <a:t>5/3/2016</a:t>
+              <a:t>5/8/2016</a:t>
             </a:fld>
             <a:endParaRPr lang="en-US"/>
           </a:p>
@@ -2428,7 +2997,7 @@
           </a:lstStyle>
           <a:p>
             <a:r>
-              <a:rPr lang="en-US" smtClean="0"/>
+              <a:rPr lang="en-US"/>
               <a:t>Click to edit Master title style</a:t>
             </a:r>
             <a:endParaRPr lang="en-US" dirty="0"/>
@@ -2501,7 +3070,7 @@
               <a:buNone/>
             </a:pPr>
             <a:r>
-              <a:rPr lang="en-US" smtClean="0"/>
+              <a:rPr lang="en-US"/>
               <a:t>Click to edit Master text styles</a:t>
             </a:r>
           </a:p>
@@ -2631,7 +3200,7 @@
           <a:p>
             <a:pPr lvl="0"/>
             <a:r>
-              <a:rPr lang="en-US" smtClean="0"/>
+              <a:rPr lang="en-US"/>
               <a:t>Click to edit Master text styles</a:t>
             </a:r>
           </a:p>
@@ -2654,7 +3223,7 @@
           <a:p>
             <a:fld id="{BDDAFA7A-6445-4002-8C74-4055B96B083F}" type="datetimeFigureOut">
               <a:rPr lang="en-US" smtClean="0"/>
-              <a:t>5/3/2016</a:t>
+              <a:t>5/8/2016</a:t>
             </a:fld>
             <a:endParaRPr lang="en-US"/>
           </a:p>
@@ -2760,7 +3329,7 @@
           <a:p>
             <a:pPr marL="0" lvl="0"/>
             <a:r>
-              <a:rPr lang="en-US" smtClean="0"/>
+              <a:rPr lang="en-US"/>
               <a:t>Click to edit Master title style</a:t>
             </a:r>
             <a:endParaRPr lang="en-US" dirty="0"/>
@@ -2833,7 +3402,7 @@
               <a:buNone/>
             </a:pPr>
             <a:r>
-              <a:rPr lang="en-US" smtClean="0"/>
+              <a:rPr lang="en-US"/>
               <a:t>Click to edit Master text styles</a:t>
             </a:r>
           </a:p>
@@ -2963,7 +3532,7 @@
           <a:p>
             <a:pPr lvl="0"/>
             <a:r>
-              <a:rPr lang="en-US" smtClean="0"/>
+              <a:rPr lang="en-US"/>
               <a:t>Click to edit Master text styles</a:t>
             </a:r>
           </a:p>
@@ -2986,7 +3555,7 @@
           <a:p>
             <a:fld id="{BDDAFA7A-6445-4002-8C74-4055B96B083F}" type="datetimeFigureOut">
               <a:rPr lang="en-US" smtClean="0"/>
-              <a:t>5/3/2016</a:t>
+              <a:t>5/8/2016</a:t>
             </a:fld>
             <a:endParaRPr lang="en-US"/>
           </a:p>
@@ -3085,7 +3654,7 @@
           <a:lstStyle/>
           <a:p>
             <a:r>
-              <a:rPr lang="en-US" smtClean="0"/>
+              <a:rPr lang="en-US"/>
               <a:t>Click to edit Master title style</a:t>
             </a:r>
             <a:endParaRPr lang="en-US" dirty="0"/>
@@ -3109,35 +3678,35 @@
           <a:p>
             <a:pPr lvl="0"/>
             <a:r>
-              <a:rPr lang="en-US" smtClean="0"/>
+              <a:rPr lang="en-US"/>
               <a:t>Click to edit Master text styles</a:t>
             </a:r>
           </a:p>
           <a:p>
             <a:pPr lvl="1"/>
             <a:r>
-              <a:rPr lang="en-US" smtClean="0"/>
+              <a:rPr lang="en-US"/>
               <a:t>Second level</a:t>
             </a:r>
           </a:p>
           <a:p>
             <a:pPr lvl="2"/>
             <a:r>
-              <a:rPr lang="en-US" smtClean="0"/>
+              <a:rPr lang="en-US"/>
               <a:t>Third level</a:t>
             </a:r>
           </a:p>
           <a:p>
             <a:pPr lvl="3"/>
             <a:r>
-              <a:rPr lang="en-US" smtClean="0"/>
+              <a:rPr lang="en-US"/>
               <a:t>Fourth level</a:t>
             </a:r>
           </a:p>
           <a:p>
             <a:pPr lvl="4"/>
             <a:r>
-              <a:rPr lang="en-US" smtClean="0"/>
+              <a:rPr lang="en-US"/>
               <a:t>Fifth level</a:t>
             </a:r>
             <a:endParaRPr lang="en-US" dirty="0"/>
@@ -3161,7 +3730,7 @@
           <a:p>
             <a:fld id="{BDDAFA7A-6445-4002-8C74-4055B96B083F}" type="datetimeFigureOut">
               <a:rPr lang="en-US" smtClean="0"/>
-              <a:t>5/3/2016</a:t>
+              <a:t>5/8/2016</a:t>
             </a:fld>
             <a:endParaRPr lang="en-US"/>
           </a:p>
@@ -3260,7 +3829,7 @@
           <a:lstStyle/>
           <a:p>
             <a:r>
-              <a:rPr lang="en-US" smtClean="0"/>
+              <a:rPr lang="en-US"/>
               <a:t>Click to edit Master title style</a:t>
             </a:r>
             <a:endParaRPr lang="en-US" dirty="0"/>
@@ -3289,35 +3858,35 @@
           <a:p>
             <a:pPr lvl="0"/>
             <a:r>
-              <a:rPr lang="en-US" smtClean="0"/>
+              <a:rPr lang="en-US"/>
               <a:t>Click to edit Master text styles</a:t>
             </a:r>
           </a:p>
           <a:p>
             <a:pPr lvl="1"/>
             <a:r>
-              <a:rPr lang="en-US" smtClean="0"/>
+              <a:rPr lang="en-US"/>
               <a:t>Second level</a:t>
             </a:r>
           </a:p>
           <a:p>
             <a:pPr lvl="2"/>
             <a:r>
-              <a:rPr lang="en-US" smtClean="0"/>
+              <a:rPr lang="en-US"/>
               <a:t>Third level</a:t>
             </a:r>
           </a:p>
           <a:p>
             <a:pPr lvl="3"/>
             <a:r>
-              <a:rPr lang="en-US" smtClean="0"/>
+              <a:rPr lang="en-US"/>
               <a:t>Fourth level</a:t>
             </a:r>
           </a:p>
           <a:p>
             <a:pPr lvl="4"/>
             <a:r>
-              <a:rPr lang="en-US" smtClean="0"/>
+              <a:rPr lang="en-US"/>
               <a:t>Fifth level</a:t>
             </a:r>
             <a:endParaRPr lang="en-US" dirty="0"/>
@@ -3341,7 +3910,7 @@
           <a:p>
             <a:fld id="{BDDAFA7A-6445-4002-8C74-4055B96B083F}" type="datetimeFigureOut">
               <a:rPr lang="en-US" smtClean="0"/>
-              <a:t>5/3/2016</a:t>
+              <a:t>5/8/2016</a:t>
             </a:fld>
             <a:endParaRPr lang="en-US"/>
           </a:p>
@@ -3440,7 +4009,7 @@
           <a:lstStyle/>
           <a:p>
             <a:r>
-              <a:rPr lang="en-US" smtClean="0"/>
+              <a:rPr lang="en-US"/>
               <a:t>Click to edit Master title style</a:t>
             </a:r>
             <a:endParaRPr lang="en-US" dirty="0"/>
@@ -3469,35 +4038,35 @@
           <a:p>
             <a:pPr lvl="0"/>
             <a:r>
-              <a:rPr lang="en-US" smtClean="0"/>
+              <a:rPr lang="en-US"/>
               <a:t>Click to edit Master text styles</a:t>
             </a:r>
           </a:p>
           <a:p>
             <a:pPr lvl="1"/>
             <a:r>
-              <a:rPr lang="en-US" smtClean="0"/>
+              <a:rPr lang="en-US"/>
               <a:t>Second level</a:t>
             </a:r>
           </a:p>
           <a:p>
             <a:pPr lvl="2"/>
             <a:r>
-              <a:rPr lang="en-US" smtClean="0"/>
+              <a:rPr lang="en-US"/>
               <a:t>Third level</a:t>
             </a:r>
           </a:p>
           <a:p>
             <a:pPr lvl="3"/>
             <a:r>
-              <a:rPr lang="en-US" smtClean="0"/>
+              <a:rPr lang="en-US"/>
               <a:t>Fourth level</a:t>
             </a:r>
           </a:p>
           <a:p>
             <a:pPr lvl="4"/>
             <a:r>
-              <a:rPr lang="en-US" smtClean="0"/>
+              <a:rPr lang="en-US"/>
               <a:t>Fifth level</a:t>
             </a:r>
             <a:endParaRPr lang="en-US" dirty="0"/>
@@ -3521,7 +4090,7 @@
           <a:p>
             <a:fld id="{BDDAFA7A-6445-4002-8C74-4055B96B083F}" type="datetimeFigureOut">
               <a:rPr lang="en-US" smtClean="0"/>
-              <a:t>5/3/2016</a:t>
+              <a:t>5/8/2016</a:t>
             </a:fld>
             <a:endParaRPr lang="en-US"/>
           </a:p>
@@ -3579,13 +4148,6 @@
   <p:clrMapOvr>
     <a:masterClrMapping/>
   </p:clrMapOvr>
-  <p:timing>
-    <p:tnLst>
-      <p:par>
-        <p:cTn id="1" dur="indefinite" restart="never" nodeType="tmRoot"/>
-      </p:par>
-    </p:tnLst>
-  </p:timing>
 </p:sldLayout>
 </file>
 
@@ -3631,7 +4193,7 @@
           </a:lstStyle>
           <a:p>
             <a:r>
-              <a:rPr lang="en-US" smtClean="0"/>
+              <a:rPr lang="en-US"/>
               <a:t>Click to edit Master title style</a:t>
             </a:r>
             <a:endParaRPr lang="en-US" dirty="0"/>
@@ -3762,7 +4324,7 @@
           <a:p>
             <a:pPr lvl="0"/>
             <a:r>
-              <a:rPr lang="en-US" smtClean="0"/>
+              <a:rPr lang="en-US"/>
               <a:t>Click to edit Master text styles</a:t>
             </a:r>
           </a:p>
@@ -3785,7 +4347,7 @@
           <a:p>
             <a:fld id="{BDDAFA7A-6445-4002-8C74-4055B96B083F}" type="datetimeFigureOut">
               <a:rPr lang="en-US" smtClean="0"/>
-              <a:t>5/3/2016</a:t>
+              <a:t>5/8/2016</a:t>
             </a:fld>
             <a:endParaRPr lang="en-US"/>
           </a:p>
@@ -3843,13 +4405,6 @@
   <p:clrMapOvr>
     <a:masterClrMapping/>
   </p:clrMapOvr>
-  <p:timing>
-    <p:tnLst>
-      <p:par>
-        <p:cTn id="1" dur="indefinite" restart="never" nodeType="tmRoot"/>
-      </p:par>
-    </p:tnLst>
-  </p:timing>
 </p:sldLayout>
 </file>
 
@@ -3886,7 +4441,7 @@
           <a:lstStyle/>
           <a:p>
             <a:r>
-              <a:rPr lang="en-US" smtClean="0"/>
+              <a:rPr lang="en-US"/>
               <a:t>Click to edit Master title style</a:t>
             </a:r>
             <a:endParaRPr lang="en-US" dirty="0"/>
@@ -3945,35 +4500,35 @@
           <a:p>
             <a:pPr lvl="0"/>
             <a:r>
-              <a:rPr lang="en-US" smtClean="0"/>
+              <a:rPr lang="en-US"/>
               <a:t>Click to edit Master text styles</a:t>
             </a:r>
           </a:p>
           <a:p>
             <a:pPr lvl="1"/>
             <a:r>
-              <a:rPr lang="en-US" smtClean="0"/>
+              <a:rPr lang="en-US"/>
               <a:t>Second level</a:t>
             </a:r>
           </a:p>
           <a:p>
             <a:pPr lvl="2"/>
             <a:r>
-              <a:rPr lang="en-US" smtClean="0"/>
+              <a:rPr lang="en-US"/>
               <a:t>Third level</a:t>
             </a:r>
           </a:p>
           <a:p>
             <a:pPr lvl="3"/>
             <a:r>
-              <a:rPr lang="en-US" smtClean="0"/>
+              <a:rPr lang="en-US"/>
               <a:t>Fourth level</a:t>
             </a:r>
           </a:p>
           <a:p>
             <a:pPr lvl="4"/>
             <a:r>
-              <a:rPr lang="en-US" smtClean="0"/>
+              <a:rPr lang="en-US"/>
               <a:t>Fifth level</a:t>
             </a:r>
             <a:endParaRPr lang="en-US" dirty="0"/>
@@ -4032,35 +4587,35 @@
           <a:p>
             <a:pPr lvl="0"/>
             <a:r>
-              <a:rPr lang="en-US" smtClean="0"/>
+              <a:rPr lang="en-US"/>
               <a:t>Click to edit Master text styles</a:t>
             </a:r>
           </a:p>
           <a:p>
             <a:pPr lvl="1"/>
             <a:r>
-              <a:rPr lang="en-US" smtClean="0"/>
+              <a:rPr lang="en-US"/>
               <a:t>Second level</a:t>
             </a:r>
           </a:p>
           <a:p>
             <a:pPr lvl="2"/>
             <a:r>
-              <a:rPr lang="en-US" smtClean="0"/>
+              <a:rPr lang="en-US"/>
               <a:t>Third level</a:t>
             </a:r>
           </a:p>
           <a:p>
             <a:pPr lvl="3"/>
             <a:r>
-              <a:rPr lang="en-US" smtClean="0"/>
+              <a:rPr lang="en-US"/>
               <a:t>Fourth level</a:t>
             </a:r>
           </a:p>
           <a:p>
             <a:pPr lvl="4"/>
             <a:r>
-              <a:rPr lang="en-US" smtClean="0"/>
+              <a:rPr lang="en-US"/>
               <a:t>Fifth level</a:t>
             </a:r>
             <a:endParaRPr lang="en-US" dirty="0"/>
@@ -4084,7 +4639,7 @@
           <a:p>
             <a:fld id="{BDDAFA7A-6445-4002-8C74-4055B96B083F}" type="datetimeFigureOut">
               <a:rPr lang="en-US" smtClean="0"/>
-              <a:t>5/3/2016</a:t>
+              <a:t>5/8/2016</a:t>
             </a:fld>
             <a:endParaRPr lang="en-US"/>
           </a:p>
@@ -4142,13 +4697,6 @@
   <p:clrMapOvr>
     <a:masterClrMapping/>
   </p:clrMapOvr>
-  <p:timing>
-    <p:tnLst>
-      <p:par>
-        <p:cTn id="1" dur="indefinite" restart="never" nodeType="tmRoot"/>
-      </p:par>
-    </p:tnLst>
-  </p:timing>
 </p:sldLayout>
 </file>
 
@@ -4189,7 +4737,7 @@
           </a:lstStyle>
           <a:p>
             <a:r>
-              <a:rPr lang="en-US" smtClean="0"/>
+              <a:rPr lang="en-US"/>
               <a:t>Click to edit Master title style</a:t>
             </a:r>
             <a:endParaRPr lang="en-US" dirty="0"/>
@@ -4257,7 +4805,7 @@
           <a:p>
             <a:pPr lvl="0"/>
             <a:r>
-              <a:rPr lang="en-US" smtClean="0"/>
+              <a:rPr lang="en-US"/>
               <a:t>Click to edit Master text styles</a:t>
             </a:r>
           </a:p>
@@ -4315,35 +4863,35 @@
           <a:p>
             <a:pPr lvl="0"/>
             <a:r>
-              <a:rPr lang="en-US" smtClean="0"/>
+              <a:rPr lang="en-US"/>
               <a:t>Click to edit Master text styles</a:t>
             </a:r>
           </a:p>
           <a:p>
             <a:pPr lvl="1"/>
             <a:r>
-              <a:rPr lang="en-US" smtClean="0"/>
+              <a:rPr lang="en-US"/>
               <a:t>Second level</a:t>
             </a:r>
           </a:p>
           <a:p>
             <a:pPr lvl="2"/>
             <a:r>
-              <a:rPr lang="en-US" smtClean="0"/>
+              <a:rPr lang="en-US"/>
               <a:t>Third level</a:t>
             </a:r>
           </a:p>
           <a:p>
             <a:pPr lvl="3"/>
             <a:r>
-              <a:rPr lang="en-US" smtClean="0"/>
+              <a:rPr lang="en-US"/>
               <a:t>Fourth level</a:t>
             </a:r>
           </a:p>
           <a:p>
             <a:pPr lvl="4"/>
             <a:r>
-              <a:rPr lang="en-US" smtClean="0"/>
+              <a:rPr lang="en-US"/>
               <a:t>Fifth level</a:t>
             </a:r>
             <a:endParaRPr lang="en-US" dirty="0"/>
@@ -4411,7 +4959,7 @@
           <a:p>
             <a:pPr lvl="0"/>
             <a:r>
-              <a:rPr lang="en-US" smtClean="0"/>
+              <a:rPr lang="en-US"/>
               <a:t>Click to edit Master text styles</a:t>
             </a:r>
           </a:p>
@@ -4469,35 +5017,35 @@
           <a:p>
             <a:pPr lvl="0"/>
             <a:r>
-              <a:rPr lang="en-US" smtClean="0"/>
+              <a:rPr lang="en-US"/>
               <a:t>Click to edit Master text styles</a:t>
             </a:r>
           </a:p>
           <a:p>
             <a:pPr lvl="1"/>
             <a:r>
-              <a:rPr lang="en-US" smtClean="0"/>
+              <a:rPr lang="en-US"/>
               <a:t>Second level</a:t>
             </a:r>
           </a:p>
           <a:p>
             <a:pPr lvl="2"/>
             <a:r>
-              <a:rPr lang="en-US" smtClean="0"/>
+              <a:rPr lang="en-US"/>
               <a:t>Third level</a:t>
             </a:r>
           </a:p>
           <a:p>
             <a:pPr lvl="3"/>
             <a:r>
-              <a:rPr lang="en-US" smtClean="0"/>
+              <a:rPr lang="en-US"/>
               <a:t>Fourth level</a:t>
             </a:r>
           </a:p>
           <a:p>
             <a:pPr lvl="4"/>
             <a:r>
-              <a:rPr lang="en-US" smtClean="0"/>
+              <a:rPr lang="en-US"/>
               <a:t>Fifth level</a:t>
             </a:r>
             <a:endParaRPr lang="en-US" dirty="0"/>
@@ -4521,7 +5069,7 @@
           <a:p>
             <a:fld id="{BDDAFA7A-6445-4002-8C74-4055B96B083F}" type="datetimeFigureOut">
               <a:rPr lang="en-US" smtClean="0"/>
-              <a:t>5/3/2016</a:t>
+              <a:t>5/8/2016</a:t>
             </a:fld>
             <a:endParaRPr lang="en-US"/>
           </a:p>
@@ -4579,13 +5127,6 @@
   <p:clrMapOvr>
     <a:masterClrMapping/>
   </p:clrMapOvr>
-  <p:timing>
-    <p:tnLst>
-      <p:par>
-        <p:cTn id="1" dur="indefinite" restart="never" nodeType="tmRoot"/>
-      </p:par>
-    </p:tnLst>
-  </p:timing>
 </p:sldLayout>
 </file>
 
@@ -4622,7 +5163,7 @@
           <a:lstStyle/>
           <a:p>
             <a:r>
-              <a:rPr lang="en-US" smtClean="0"/>
+              <a:rPr lang="en-US"/>
               <a:t>Click to edit Master title style</a:t>
             </a:r>
             <a:endParaRPr lang="en-US" dirty="0"/>
@@ -4646,7 +5187,7 @@
           <a:p>
             <a:fld id="{BDDAFA7A-6445-4002-8C74-4055B96B083F}" type="datetimeFigureOut">
               <a:rPr lang="en-US" smtClean="0"/>
-              <a:t>5/3/2016</a:t>
+              <a:t>5/8/2016</a:t>
             </a:fld>
             <a:endParaRPr lang="en-US"/>
           </a:p>
@@ -4704,13 +5245,6 @@
   <p:clrMapOvr>
     <a:masterClrMapping/>
   </p:clrMapOvr>
-  <p:timing>
-    <p:tnLst>
-      <p:par>
-        <p:cTn id="1" dur="indefinite" restart="never" nodeType="tmRoot"/>
-      </p:par>
-    </p:tnLst>
-  </p:timing>
 </p:sldLayout>
 </file>
 
@@ -4748,7 +5282,7 @@
           <a:p>
             <a:fld id="{BDDAFA7A-6445-4002-8C74-4055B96B083F}" type="datetimeFigureOut">
               <a:rPr lang="en-US" smtClean="0"/>
-              <a:t>5/3/2016</a:t>
+              <a:t>5/8/2016</a:t>
             </a:fld>
             <a:endParaRPr lang="en-US"/>
           </a:p>
@@ -4806,13 +5340,6 @@
   <p:clrMapOvr>
     <a:masterClrMapping/>
   </p:clrMapOvr>
-  <p:timing>
-    <p:tnLst>
-      <p:par>
-        <p:cTn id="1" dur="indefinite" restart="never" nodeType="tmRoot"/>
-      </p:par>
-    </p:tnLst>
-  </p:timing>
 </p:sldLayout>
 </file>
 
@@ -4860,7 +5387,7 @@
           </a:lstStyle>
           <a:p>
             <a:r>
-              <a:rPr lang="en-US" smtClean="0"/>
+              <a:rPr lang="en-US"/>
               <a:t>Click to edit Master title style</a:t>
             </a:r>
             <a:endParaRPr lang="en-US" dirty="0"/>
@@ -4919,35 +5446,35 @@
           <a:p>
             <a:pPr lvl="0"/>
             <a:r>
-              <a:rPr lang="en-US" smtClean="0"/>
+              <a:rPr lang="en-US"/>
               <a:t>Click to edit Master text styles</a:t>
             </a:r>
           </a:p>
           <a:p>
             <a:pPr lvl="1"/>
             <a:r>
-              <a:rPr lang="en-US" smtClean="0"/>
+              <a:rPr lang="en-US"/>
               <a:t>Second level</a:t>
             </a:r>
           </a:p>
           <a:p>
             <a:pPr lvl="2"/>
             <a:r>
-              <a:rPr lang="en-US" smtClean="0"/>
+              <a:rPr lang="en-US"/>
               <a:t>Third level</a:t>
             </a:r>
           </a:p>
           <a:p>
             <a:pPr lvl="3"/>
             <a:r>
-              <a:rPr lang="en-US" smtClean="0"/>
+              <a:rPr lang="en-US"/>
               <a:t>Fourth level</a:t>
             </a:r>
           </a:p>
           <a:p>
             <a:pPr lvl="4"/>
             <a:r>
-              <a:rPr lang="en-US" smtClean="0"/>
+              <a:rPr lang="en-US"/>
               <a:t>Fifth level</a:t>
             </a:r>
             <a:endParaRPr lang="en-US" dirty="0"/>
@@ -5015,7 +5542,7 @@
           <a:p>
             <a:pPr lvl="0"/>
             <a:r>
-              <a:rPr lang="en-US" smtClean="0"/>
+              <a:rPr lang="en-US"/>
               <a:t>Click to edit Master text styles</a:t>
             </a:r>
           </a:p>
@@ -5038,7 +5565,7 @@
           <a:p>
             <a:fld id="{BDDAFA7A-6445-4002-8C74-4055B96B083F}" type="datetimeFigureOut">
               <a:rPr lang="en-US" smtClean="0"/>
-              <a:t>5/3/2016</a:t>
+              <a:t>5/8/2016</a:t>
             </a:fld>
             <a:endParaRPr lang="en-US"/>
           </a:p>
@@ -5096,13 +5623,6 @@
   <p:clrMapOvr>
     <a:masterClrMapping/>
   </p:clrMapOvr>
-  <p:timing>
-    <p:tnLst>
-      <p:par>
-        <p:cTn id="1" dur="indefinite" restart="never" nodeType="tmRoot"/>
-      </p:par>
-    </p:tnLst>
-  </p:timing>
 </p:sldLayout>
 </file>
 
@@ -5150,7 +5670,7 @@
           </a:lstStyle>
           <a:p>
             <a:r>
-              <a:rPr lang="en-US" smtClean="0"/>
+              <a:rPr lang="en-US"/>
               <a:t>Click to edit Master title style</a:t>
             </a:r>
             <a:endParaRPr lang="en-US" dirty="0"/>
@@ -5240,7 +5760,7 @@
           </a:lstStyle>
           <a:p>
             <a:r>
-              <a:rPr lang="en-US" smtClean="0"/>
+              <a:rPr lang="en-US"/>
               <a:t>Click icon to add picture</a:t>
             </a:r>
             <a:endParaRPr lang="en-US" dirty="0"/>
@@ -5308,7 +5828,7 @@
           <a:p>
             <a:pPr lvl="0"/>
             <a:r>
-              <a:rPr lang="en-US" smtClean="0"/>
+              <a:rPr lang="en-US"/>
               <a:t>Click to edit Master text styles</a:t>
             </a:r>
           </a:p>
@@ -5336,7 +5856,7 @@
           <a:p>
             <a:fld id="{BDDAFA7A-6445-4002-8C74-4055B96B083F}" type="datetimeFigureOut">
               <a:rPr lang="en-US" smtClean="0"/>
-              <a:t>5/3/2016</a:t>
+              <a:t>5/8/2016</a:t>
             </a:fld>
             <a:endParaRPr lang="en-US"/>
           </a:p>
@@ -5404,13 +5924,6 @@
   <p:clrMapOvr>
     <a:masterClrMapping/>
   </p:clrMapOvr>
-  <p:timing>
-    <p:tnLst>
-      <p:par>
-        <p:cTn id="1" dur="indefinite" restart="never" nodeType="tmRoot"/>
-      </p:par>
-    </p:tnLst>
-  </p:timing>
 </p:sldLayout>
 </file>
 
@@ -5462,7 +5975,7 @@
           <a:lstStyle/>
           <a:p>
             <a:r>
-              <a:rPr lang="en-US" smtClean="0"/>
+              <a:rPr lang="en-US"/>
               <a:t>Click to edit Master title style</a:t>
             </a:r>
             <a:endParaRPr lang="en-US" dirty="0"/>
@@ -5496,35 +6009,35 @@
           <a:p>
             <a:pPr lvl="0"/>
             <a:r>
-              <a:rPr lang="en-US" smtClean="0"/>
+              <a:rPr lang="en-US"/>
               <a:t>Click to edit Master text styles</a:t>
             </a:r>
           </a:p>
           <a:p>
             <a:pPr lvl="1"/>
             <a:r>
-              <a:rPr lang="en-US" smtClean="0"/>
+              <a:rPr lang="en-US"/>
               <a:t>Second level</a:t>
             </a:r>
           </a:p>
           <a:p>
             <a:pPr lvl="2"/>
             <a:r>
-              <a:rPr lang="en-US" smtClean="0"/>
+              <a:rPr lang="en-US"/>
               <a:t>Third level</a:t>
             </a:r>
           </a:p>
           <a:p>
             <a:pPr lvl="3"/>
             <a:r>
-              <a:rPr lang="en-US" smtClean="0"/>
+              <a:rPr lang="en-US"/>
               <a:t>Fourth level</a:t>
             </a:r>
           </a:p>
           <a:p>
             <a:pPr lvl="4"/>
             <a:r>
-              <a:rPr lang="en-US" smtClean="0"/>
+              <a:rPr lang="en-US"/>
               <a:t>Fifth level</a:t>
             </a:r>
             <a:endParaRPr lang="en-US" dirty="0"/>
@@ -5574,7 +6087,7 @@
           <a:p>
             <a:fld id="{BDDAFA7A-6445-4002-8C74-4055B96B083F}" type="datetimeFigureOut">
               <a:rPr lang="en-US" smtClean="0"/>
-              <a:t>5/3/2016</a:t>
+              <a:t>5/8/2016</a:t>
             </a:fld>
             <a:endParaRPr lang="en-US"/>
           </a:p>
@@ -6353,24 +6866,42 @@
             <p:ph type="ctrTitle"/>
           </p:nvPr>
         </p:nvSpPr>
-        <p:spPr/>
+        <p:spPr>
+          <a:xfrm>
+            <a:off x="1751013" y="609600"/>
+            <a:ext cx="8675687" cy="2190634"/>
+          </a:xfrm>
+        </p:spPr>
         <p:txBody>
           <a:bodyPr/>
           <a:lstStyle/>
           <a:p>
             <a:r>
-              <a:rPr lang="en-US" dirty="0" err="1" smtClean="0"/>
-              <a:t>BNP</a:t>
-            </a:r>
-            <a:r>
-              <a:rPr lang="en-US" dirty="0" smtClean="0"/>
-              <a:t> Paribas </a:t>
-            </a:r>
-            <a:r>
-              <a:rPr lang="en-US" dirty="0" err="1" smtClean="0"/>
+              <a:rPr lang="en-US" sz="6000" b="1" dirty="0" err="1">
+                <a:latin typeface="Times"/>
+              </a:rPr>
+              <a:t>Kaggle</a:t>
+            </a:r>
+            <a:br>
+              <a:rPr lang="en-US" sz="6000" b="1" dirty="0">
+                <a:latin typeface="Times"/>
+              </a:rPr>
+            </a:br>
+            <a:r>
+              <a:rPr lang="en-US" sz="6000" b="1" dirty="0">
+                <a:latin typeface="Times"/>
+              </a:rPr>
+              <a:t>BNP Paribas </a:t>
+            </a:r>
+            <a:r>
+              <a:rPr lang="en-US" sz="6000" b="1" dirty="0" err="1">
+                <a:latin typeface="Times"/>
+              </a:rPr>
               <a:t>Cardif</a:t>
             </a:r>
-            <a:endParaRPr lang="en-US" dirty="0"/>
+            <a:endParaRPr lang="en-US" sz="6000" b="1" dirty="0">
+              <a:latin typeface="Times"/>
+            </a:endParaRPr>
           </a:p>
         </p:txBody>
       </p:sp>
@@ -6384,66 +6915,37 @@
             <p:ph type="subTitle" idx="1"/>
           </p:nvPr>
         </p:nvSpPr>
-        <p:spPr/>
-        <p:txBody>
-          <a:bodyPr/>
-          <a:lstStyle/>
-          <a:p>
-            <a:r>
-              <a:rPr lang="en-US" dirty="0" smtClean="0"/>
-              <a:t>Team</a:t>
-            </a:r>
-          </a:p>
-          <a:p>
-            <a:r>
-              <a:rPr lang="en-US" dirty="0" smtClean="0"/>
-              <a:t>GAUSS</a:t>
-            </a:r>
-          </a:p>
-          <a:p>
-            <a:r>
-              <a:rPr lang="en-GB" dirty="0" err="1" smtClean="0">
+        <p:spPr>
+          <a:xfrm>
+            <a:off x="1046522" y="3865163"/>
+            <a:ext cx="10084296" cy="1905000"/>
+          </a:xfrm>
+        </p:spPr>
+        <p:txBody>
+          <a:bodyPr>
+            <a:normAutofit fontScale="92500"/>
+          </a:bodyPr>
+          <a:lstStyle/>
+          <a:p>
+            <a:r>
+              <a:rPr lang="en-US" sz="4000" dirty="0"/>
+              <a:t>Team GAUSS</a:t>
+            </a:r>
+          </a:p>
+          <a:p>
+            <a:r>
+              <a:rPr lang="en-GB" sz="4000" dirty="0" err="1">
                 <a:effectLst/>
               </a:rPr>
               <a:t>Antonios</a:t>
             </a:r>
             <a:r>
-              <a:rPr lang="en-GB" dirty="0" smtClean="0">
+              <a:rPr lang="en-GB" sz="4000" dirty="0">
                 <a:effectLst/>
               </a:rPr>
-              <a:t>, </a:t>
-            </a:r>
-            <a:r>
-              <a:rPr lang="en-GB" dirty="0" err="1" smtClean="0">
-                <a:effectLst/>
-              </a:rPr>
-              <a:t>Nikolaos</a:t>
-            </a:r>
-            <a:r>
-              <a:rPr lang="en-GB" dirty="0" smtClean="0">
-                <a:effectLst/>
-              </a:rPr>
-              <a:t>, Napoleon, </a:t>
-            </a:r>
-            <a:r>
-              <a:rPr lang="en-GB" dirty="0" err="1" smtClean="0">
-                <a:effectLst/>
-              </a:rPr>
-              <a:t>Danial</a:t>
-            </a:r>
-            <a:r>
-              <a:rPr lang="en-GB" dirty="0">
-                <a:effectLst/>
-              </a:rPr>
-              <a:t> </a:t>
-            </a:r>
-            <a:r>
-              <a:rPr lang="en-GB" dirty="0" smtClean="0">
-                <a:effectLst/>
-              </a:rPr>
-              <a:t>&amp; Ali</a:t>
-            </a:r>
-            <a:endParaRPr lang="en-US" dirty="0"/>
+              <a:t>, Nikolaos, Napoleon, Danial &amp; Ali</a:t>
+            </a:r>
+            <a:endParaRPr lang="en-US" sz="4000" dirty="0"/>
           </a:p>
         </p:txBody>
       </p:sp>
@@ -6457,13 +6959,6 @@
   <p:clrMapOvr>
     <a:masterClrMapping/>
   </p:clrMapOvr>
-  <p:timing>
-    <p:tnLst>
-      <p:par>
-        <p:cTn id="1" dur="indefinite" restart="never" nodeType="tmRoot"/>
-      </p:par>
-    </p:tnLst>
-  </p:timing>
 </p:sld>
 </file>
 
@@ -6500,10 +6995,9 @@
           <a:lstStyle/>
           <a:p>
             <a:r>
-              <a:rPr lang="en-US" dirty="0" smtClean="0"/>
+              <a:rPr lang="en-US" dirty="0"/>
               <a:t>Agenda</a:t>
             </a:r>
-            <a:endParaRPr lang="en-US" dirty="0"/>
           </a:p>
         </p:txBody>
       </p:sp>
@@ -6530,70 +7024,63 @@
           <a:lstStyle/>
           <a:p>
             <a:r>
-              <a:rPr lang="en-US" dirty="0" smtClean="0"/>
+              <a:rPr lang="en-US" dirty="0"/>
               <a:t>The Scenario</a:t>
             </a:r>
           </a:p>
           <a:p>
             <a:pPr lvl="1"/>
             <a:r>
-              <a:rPr lang="en-US" sz="2000" dirty="0" smtClean="0"/>
-              <a:t>The </a:t>
-            </a:r>
-            <a:r>
-              <a:rPr lang="en-US" sz="2000" dirty="0" smtClean="0"/>
-              <a:t>Project</a:t>
-            </a:r>
-            <a:endParaRPr lang="en-US" sz="2000" dirty="0" smtClean="0"/>
+              <a:rPr lang="en-US" sz="2000" dirty="0"/>
+              <a:t>The Project</a:t>
+            </a:r>
           </a:p>
           <a:p>
             <a:pPr lvl="1"/>
             <a:r>
-              <a:rPr lang="en-US" sz="2000" dirty="0" smtClean="0"/>
+              <a:rPr lang="en-US" sz="2000" dirty="0"/>
               <a:t>The data</a:t>
             </a:r>
           </a:p>
           <a:p>
             <a:r>
-              <a:rPr lang="en-US" dirty="0" smtClean="0"/>
-              <a:t>The </a:t>
-            </a:r>
-            <a:r>
-              <a:rPr lang="en-US" dirty="0" smtClean="0"/>
-              <a:t>Analytics</a:t>
-            </a:r>
-            <a:endParaRPr lang="en-US" dirty="0" smtClean="0"/>
+              <a:rPr lang="en-US" dirty="0"/>
+              <a:t>The Analytics</a:t>
+            </a:r>
           </a:p>
           <a:p>
             <a:pPr lvl="1"/>
             <a:r>
-              <a:rPr lang="en-US" sz="2000" dirty="0" smtClean="0"/>
+              <a:rPr lang="en-US" sz="2000" dirty="0"/>
               <a:t>Data Pre-processing</a:t>
             </a:r>
-            <a:endParaRPr lang="en-US" sz="2000" dirty="0" smtClean="0"/>
           </a:p>
           <a:p>
             <a:pPr lvl="1"/>
             <a:r>
-              <a:rPr lang="en-US" sz="2000" dirty="0" smtClean="0"/>
+              <a:rPr lang="en-US" sz="2000" dirty="0"/>
+              <a:t>Feature extraction</a:t>
+            </a:r>
+          </a:p>
+          <a:p>
+            <a:pPr lvl="1"/>
+            <a:r>
+              <a:rPr lang="en-US" sz="2000" dirty="0"/>
               <a:t>Data Modelling Algorithms</a:t>
             </a:r>
-            <a:endParaRPr lang="en-US" sz="2000" dirty="0" smtClean="0"/>
           </a:p>
           <a:p>
             <a:pPr lvl="1"/>
             <a:r>
-              <a:rPr lang="en-US" sz="2000" dirty="0" smtClean="0"/>
+              <a:rPr lang="en-US" sz="2000" dirty="0"/>
               <a:t>Analytics Results</a:t>
             </a:r>
-            <a:endParaRPr lang="en-US" sz="2000" dirty="0" smtClean="0"/>
-          </a:p>
-          <a:p>
-            <a:r>
-              <a:rPr lang="en-US" dirty="0" smtClean="0"/>
+          </a:p>
+          <a:p>
+            <a:r>
+              <a:rPr lang="en-US" dirty="0"/>
               <a:t>Conclusion</a:t>
             </a:r>
-            <a:endParaRPr lang="en-US" dirty="0" smtClean="0"/>
           </a:p>
           <a:p>
             <a:pPr lvl="1"/>
@@ -6611,13 +7098,6 @@
   <p:clrMapOvr>
     <a:masterClrMapping/>
   </p:clrMapOvr>
-  <p:timing>
-    <p:tnLst>
-      <p:par>
-        <p:cTn id="1" dur="indefinite" restart="never" nodeType="tmRoot"/>
-      </p:par>
-    </p:tnLst>
-  </p:timing>
 </p:sld>
 </file>
 
@@ -6653,11 +7133,11 @@
           <a:bodyPr/>
           <a:lstStyle/>
           <a:p>
-            <a:r>
-              <a:rPr lang="en-US" dirty="0" smtClean="0"/>
+            <a:pPr algn="ctr"/>
+            <a:r>
+              <a:rPr lang="en-US" b="1" dirty="0"/>
               <a:t>The Project</a:t>
             </a:r>
-            <a:endParaRPr lang="en-US" dirty="0"/>
           </a:p>
         </p:txBody>
       </p:sp>
@@ -6671,16 +7151,43 @@
             <p:ph idx="1"/>
           </p:nvPr>
         </p:nvSpPr>
-        <p:spPr/>
-        <p:txBody>
-          <a:bodyPr/>
-          <a:lstStyle/>
-          <a:p>
-            <a:r>
-              <a:rPr lang="en-US" dirty="0" err="1" smtClean="0"/>
-              <a:t>Unders</a:t>
-            </a:r>
-            <a:endParaRPr lang="en-US" dirty="0"/>
+        <p:spPr>
+          <a:xfrm>
+            <a:off x="1141412" y="2369159"/>
+            <a:ext cx="9905998" cy="2502879"/>
+          </a:xfrm>
+        </p:spPr>
+        <p:txBody>
+          <a:bodyPr>
+            <a:normAutofit/>
+          </a:bodyPr>
+          <a:lstStyle/>
+          <a:p>
+            <a:r>
+              <a:rPr lang="en-GB" sz="3200" dirty="0"/>
+              <a:t>Supervised Learning  Classification Problem</a:t>
+            </a:r>
+          </a:p>
+          <a:p>
+            <a:r>
+              <a:rPr lang="en-GB" sz="3200" dirty="0"/>
+              <a:t>Predict the Validity of Insurance Claims</a:t>
+            </a:r>
+          </a:p>
+          <a:p>
+            <a:r>
+              <a:rPr lang="en-GB" sz="3200" dirty="0"/>
+              <a:t>Log – Loss Function for performance evaluation</a:t>
+            </a:r>
+          </a:p>
+          <a:p>
+            <a:pPr marL="0" indent="0">
+              <a:buNone/>
+            </a:pPr>
+            <a:endParaRPr lang="en-GB" sz="3200" dirty="0"/>
+          </a:p>
+          <a:p>
+            <a:endParaRPr lang="en-GB" sz="3200" dirty="0"/>
           </a:p>
         </p:txBody>
       </p:sp>
@@ -6694,13 +7201,6 @@
   <p:clrMapOvr>
     <a:masterClrMapping/>
   </p:clrMapOvr>
-  <p:timing>
-    <p:tnLst>
-      <p:par>
-        <p:cTn id="1" dur="indefinite" restart="never" nodeType="tmRoot"/>
-      </p:par>
-    </p:tnLst>
-  </p:timing>
 </p:sld>
 </file>
 
@@ -6737,14 +7237,9 @@
           <a:lstStyle/>
           <a:p>
             <a:r>
-              <a:rPr lang="en-GB" dirty="0" smtClean="0"/>
-              <a:t>The </a:t>
-            </a:r>
-            <a:r>
-              <a:rPr lang="en-GB" dirty="0" smtClean="0"/>
-              <a:t>Data</a:t>
-            </a:r>
-            <a:endParaRPr lang="en-GB" dirty="0"/>
+              <a:rPr lang="en-GB" dirty="0"/>
+              <a:t>The Data</a:t>
+            </a:r>
           </a:p>
         </p:txBody>
       </p:sp>
@@ -6758,15 +7253,98 @@
             <p:ph idx="1"/>
           </p:nvPr>
         </p:nvSpPr>
-        <p:spPr/>
-        <p:txBody>
-          <a:bodyPr/>
-          <a:lstStyle/>
-          <a:p>
-            <a:endParaRPr lang="en-GB" dirty="0"/>
-          </a:p>
-        </p:txBody>
-      </p:sp>
+        <p:spPr>
+          <a:xfrm>
+            <a:off x="1141413" y="1470025"/>
+            <a:ext cx="10136967" cy="3028873"/>
+          </a:xfrm>
+        </p:spPr>
+        <p:txBody>
+          <a:bodyPr>
+            <a:normAutofit fontScale="62500" lnSpcReduction="20000"/>
+          </a:bodyPr>
+          <a:lstStyle/>
+          <a:p>
+            <a:r>
+              <a:rPr lang="en-US" sz="2800" dirty="0"/>
+              <a:t>131 FEATURES - INDEPENDENT VARIABLES</a:t>
+            </a:r>
+          </a:p>
+          <a:p>
+            <a:pPr lvl="1"/>
+            <a:r>
+              <a:rPr lang="en-US" sz="2800" dirty="0"/>
+              <a:t> ANONYMIZED</a:t>
+            </a:r>
+          </a:p>
+          <a:p>
+            <a:pPr lvl="1"/>
+            <a:r>
+              <a:rPr lang="en-US" sz="2800" dirty="0"/>
+              <a:t>Numerical and Categorical</a:t>
+            </a:r>
+          </a:p>
+          <a:p>
+            <a:r>
+              <a:rPr lang="en-US" sz="2800" dirty="0"/>
+              <a:t>THE ISSUES</a:t>
+            </a:r>
+          </a:p>
+          <a:p>
+            <a:pPr lvl="1"/>
+            <a:r>
+              <a:rPr lang="en-US" sz="2800" dirty="0"/>
+              <a:t>MISSING VALUES</a:t>
+            </a:r>
+          </a:p>
+          <a:p>
+            <a:pPr lvl="1"/>
+            <a:r>
+              <a:rPr lang="en-US" sz="2800" dirty="0"/>
+              <a:t>HANDLING NOMINAL CATEGORICAL FEATURES</a:t>
+            </a:r>
+          </a:p>
+          <a:p>
+            <a:r>
+              <a:rPr lang="en-US" sz="3000" dirty="0"/>
+              <a:t>DIFFERENT SCALES FOR VARIABLES</a:t>
+            </a:r>
+          </a:p>
+          <a:p>
+            <a:r>
+              <a:rPr lang="en-US" sz="3000" dirty="0"/>
+              <a:t>High Number of Distinct Values on some Categorical Features:</a:t>
+            </a:r>
+          </a:p>
+          <a:p>
+            <a:endParaRPr lang="en-US" sz="2800" dirty="0"/>
+          </a:p>
+        </p:txBody>
+      </p:sp>
+      <p:pic>
+        <p:nvPicPr>
+          <p:cNvPr id="5" name="Content Placeholder 3" descr="Screen Shot 2016-05-09 at 01.22.17.png"/>
+          <p:cNvPicPr>
+            <a:picLocks noChangeAspect="1"/>
+          </p:cNvPicPr>
+          <p:nvPr/>
+        </p:nvPicPr>
+        <p:blipFill>
+          <a:blip r:embed="rId3"/>
+          <a:stretch>
+            <a:fillRect/>
+          </a:stretch>
+        </p:blipFill>
+        <p:spPr>
+          <a:xfrm>
+            <a:off x="1033583" y="4672336"/>
+            <a:ext cx="10360940" cy="1526043"/>
+          </a:xfrm>
+          <a:prstGeom prst="rect">
+            <a:avLst/>
+          </a:prstGeom>
+        </p:spPr>
+      </p:pic>
     </p:spTree>
     <p:extLst>
       <p:ext uri="{BB962C8B-B14F-4D97-AF65-F5344CB8AC3E}">
@@ -6813,10 +7391,9 @@
           <a:lstStyle/>
           <a:p>
             <a:r>
-              <a:rPr lang="en-US" dirty="0" smtClean="0"/>
+              <a:rPr lang="en-US" dirty="0"/>
               <a:t>Data Pre-processing</a:t>
             </a:r>
-            <a:endParaRPr lang="en-US" dirty="0"/>
           </a:p>
         </p:txBody>
       </p:sp>
@@ -6837,10 +7414,58 @@
           </a:xfrm>
         </p:spPr>
         <p:txBody>
-          <a:bodyPr/>
-          <a:lstStyle/>
-          <a:p>
-            <a:endParaRPr lang="en-US" dirty="0"/>
+          <a:bodyPr>
+            <a:normAutofit fontScale="92500" lnSpcReduction="10000"/>
+          </a:bodyPr>
+          <a:lstStyle/>
+          <a:p>
+            <a:r>
+              <a:rPr lang="en-US" sz="3200" dirty="0"/>
+              <a:t>Categorical features Conversion</a:t>
+            </a:r>
+          </a:p>
+          <a:p>
+            <a:pPr lvl="1"/>
+            <a:r>
+              <a:rPr lang="en-US" sz="3000" dirty="0"/>
+              <a:t>One-hot-encoder dismissed</a:t>
+            </a:r>
+          </a:p>
+          <a:p>
+            <a:pPr lvl="1"/>
+            <a:r>
+              <a:rPr lang="en-US" sz="3000" dirty="0"/>
+              <a:t>Replace value with conditional probability</a:t>
+            </a:r>
+          </a:p>
+          <a:p>
+            <a:r>
+              <a:rPr lang="en-US" sz="3200" dirty="0"/>
+              <a:t>Filling Missing Values </a:t>
+            </a:r>
+          </a:p>
+          <a:p>
+            <a:pPr lvl="1"/>
+            <a:r>
+              <a:rPr lang="en-US" sz="3000" dirty="0"/>
+              <a:t>Non-negative matrix factorization tried</a:t>
+            </a:r>
+          </a:p>
+          <a:p>
+            <a:pPr lvl="1"/>
+            <a:r>
+              <a:rPr lang="en-US" sz="3000" dirty="0"/>
+              <a:t> median</a:t>
+            </a:r>
+          </a:p>
+          <a:p>
+            <a:r>
+              <a:rPr lang="en-US" sz="3200" dirty="0"/>
+              <a:t>Standardization --&gt; Algorithm Efficiency​​​</a:t>
+            </a:r>
+          </a:p>
+          <a:p>
+            <a:endParaRPr lang="en-US" sz="3200" dirty="0"/>
           </a:p>
         </p:txBody>
       </p:sp>
@@ -6854,13 +7479,6 @@
   <p:clrMapOvr>
     <a:masterClrMapping/>
   </p:clrMapOvr>
-  <p:timing>
-    <p:tnLst>
-      <p:par>
-        <p:cTn id="1" dur="indefinite" restart="never" nodeType="tmRoot"/>
-      </p:par>
-    </p:tnLst>
-  </p:timing>
 </p:sld>
 </file>
 
@@ -6897,10 +7515,9 @@
           <a:lstStyle/>
           <a:p>
             <a:r>
-              <a:rPr lang="en-US" dirty="0" smtClean="0"/>
+              <a:rPr lang="en-US" dirty="0"/>
               <a:t>Data Modelling ALGORITHMS</a:t>
             </a:r>
-            <a:endParaRPr lang="en-US" dirty="0"/>
           </a:p>
         </p:txBody>
       </p:sp>
@@ -6914,12 +7531,40 @@
             <p:ph idx="1"/>
           </p:nvPr>
         </p:nvSpPr>
-        <p:spPr/>
-        <p:txBody>
-          <a:bodyPr/>
-          <a:lstStyle/>
-          <a:p>
-            <a:endParaRPr lang="en-US" dirty="0" smtClean="0"/>
+        <p:spPr>
+          <a:xfrm>
+            <a:off x="1141412" y="2844026"/>
+            <a:ext cx="9906000" cy="2581283"/>
+          </a:xfrm>
+        </p:spPr>
+        <p:txBody>
+          <a:bodyPr>
+            <a:normAutofit fontScale="92500" lnSpcReduction="10000"/>
+          </a:bodyPr>
+          <a:lstStyle/>
+          <a:p>
+            <a:r>
+              <a:rPr lang="en-US" sz="3600" dirty="0"/>
+              <a:t>Logistic Regression</a:t>
+            </a:r>
+          </a:p>
+          <a:p>
+            <a:r>
+              <a:rPr lang="en-US" sz="3600" dirty="0"/>
+              <a:t>Support Vector Machines</a:t>
+            </a:r>
+          </a:p>
+          <a:p>
+            <a:r>
+              <a:rPr lang="en-US" sz="3600" dirty="0"/>
+              <a:t>Decision Trees</a:t>
+            </a:r>
+          </a:p>
+          <a:p>
+            <a:r>
+              <a:rPr lang="en-US" sz="3600" dirty="0"/>
+              <a:t>Random Forest Classifier</a:t>
+            </a:r>
           </a:p>
         </p:txBody>
       </p:sp>
@@ -6933,13 +7578,6 @@
   <p:clrMapOvr>
     <a:masterClrMapping/>
   </p:clrMapOvr>
-  <p:timing>
-    <p:tnLst>
-      <p:par>
-        <p:cTn id="1" dur="indefinite" restart="never" nodeType="tmRoot"/>
-      </p:par>
-    </p:tnLst>
-  </p:timing>
 </p:sld>
 </file>
 
@@ -6972,53 +7610,51 @@
         </p:nvSpPr>
         <p:spPr/>
         <p:txBody>
-          <a:bodyPr/>
-          <a:lstStyle/>
-          <a:p>
-            <a:r>
-              <a:rPr lang="en-US" dirty="0" smtClean="0"/>
-              <a:t>Analytics results</a:t>
-            </a:r>
-            <a:endParaRPr lang="en-US" dirty="0"/>
-          </a:p>
-        </p:txBody>
-      </p:sp>
-      <p:sp>
-        <p:nvSpPr>
-          <p:cNvPr id="3" name="Content Placeholder 2"/>
-          <p:cNvSpPr>
-            <a:spLocks noGrp="1"/>
-          </p:cNvSpPr>
+          <a:bodyPr>
+            <a:normAutofit/>
+          </a:bodyPr>
+          <a:lstStyle/>
+          <a:p>
+            <a:r>
+              <a:rPr lang="en-US" dirty="0"/>
+              <a:t>Feature importance</a:t>
+            </a:r>
+          </a:p>
+        </p:txBody>
+      </p:sp>
+      <p:pic>
+        <p:nvPicPr>
+          <p:cNvPr id="4" name="Content Placeholder 3" descr="Screen Shot 2016-05-09 at 01.07.32.png"/>
+          <p:cNvPicPr>
+            <a:picLocks noGrp="1" noChangeAspect="1"/>
+          </p:cNvPicPr>
           <p:nvPr>
             <p:ph idx="1"/>
           </p:nvPr>
-        </p:nvSpPr>
-        <p:spPr/>
-        <p:txBody>
-          <a:bodyPr/>
-          <a:lstStyle/>
-          <a:p>
-            <a:endParaRPr lang="en-US" dirty="0"/>
-          </a:p>
-        </p:txBody>
-      </p:sp>
+        </p:nvPicPr>
+        <p:blipFill>
+          <a:blip r:embed="rId3"/>
+          <a:stretch>
+            <a:fillRect/>
+          </a:stretch>
+        </p:blipFill>
+        <p:spPr>
+          <a:xfrm>
+            <a:off x="2860188" y="1625600"/>
+            <a:ext cx="6468450" cy="4165600"/>
+          </a:xfrm>
+        </p:spPr>
+      </p:pic>
     </p:spTree>
     <p:extLst>
       <p:ext uri="{BB962C8B-B14F-4D97-AF65-F5344CB8AC3E}">
-        <p14:creationId xmlns:p14="http://schemas.microsoft.com/office/powerpoint/2010/main" val="187502220"/>
+        <p14:creationId xmlns:p14="http://schemas.microsoft.com/office/powerpoint/2010/main" val="177060313"/>
       </p:ext>
     </p:extLst>
   </p:cSld>
   <p:clrMapOvr>
     <a:masterClrMapping/>
   </p:clrMapOvr>
-  <p:timing>
-    <p:tnLst>
-      <p:par>
-        <p:cTn id="1" dur="indefinite" restart="never" nodeType="tmRoot"/>
-      </p:par>
-    </p:tnLst>
-  </p:timing>
 </p:sld>
 </file>
 
@@ -7055,10 +7691,463 @@
           <a:lstStyle/>
           <a:p>
             <a:r>
-              <a:rPr lang="en-US" dirty="0" smtClean="0"/>
+              <a:rPr lang="en-US" dirty="0" err="1"/>
+              <a:t>ALgoritHms'</a:t>
+            </a:r>
+            <a:r>
+              <a:rPr lang="en-US" dirty="0"/>
+              <a:t> results</a:t>
+            </a:r>
+          </a:p>
+        </p:txBody>
+      </p:sp>
+      <p:graphicFrame>
+        <p:nvGraphicFramePr>
+          <p:cNvPr id="6" name="Content Placeholder 5"/>
+          <p:cNvGraphicFramePr>
+            <a:graphicFrameLocks noGrp="1"/>
+          </p:cNvGraphicFramePr>
+          <p:nvPr>
+            <p:ph idx="1"/>
+            <p:extLst>
+              <p:ext uri="{D42A27DB-BD31-4B8C-83A1-F6EECF244321}">
+                <p14:modId xmlns:p14="http://schemas.microsoft.com/office/powerpoint/2010/main" val="1774416246"/>
+              </p:ext>
+            </p:extLst>
+          </p:nvPr>
+        </p:nvGraphicFramePr>
+        <p:xfrm>
+          <a:off x="646981" y="1639018"/>
+          <a:ext cx="11021704" cy="4227149"/>
+        </p:xfrm>
+        <a:graphic>
+          <a:graphicData uri="http://schemas.openxmlformats.org/drawingml/2006/table">
+            <a:tbl>
+              <a:tblPr firstRow="1" bandRow="1">
+                <a:tableStyleId>{5C22544A-7EE6-4342-B048-85BDC9FD1C3A}</a:tableStyleId>
+              </a:tblPr>
+              <a:tblGrid>
+                <a:gridCol w="2755426">
+                  <a:extLst>
+                    <a:ext uri="{9D8B030D-6E8A-4147-A177-3AD203B41FA5}">
+                      <a16:colId xmlns:a16="http://schemas.microsoft.com/office/drawing/2014/main" val="892120211"/>
+                    </a:ext>
+                  </a:extLst>
+                </a:gridCol>
+                <a:gridCol w="2755426">
+                  <a:extLst>
+                    <a:ext uri="{9D8B030D-6E8A-4147-A177-3AD203B41FA5}">
+                      <a16:colId xmlns:a16="http://schemas.microsoft.com/office/drawing/2014/main" val="3912911469"/>
+                    </a:ext>
+                  </a:extLst>
+                </a:gridCol>
+                <a:gridCol w="2755426">
+                  <a:extLst>
+                    <a:ext uri="{9D8B030D-6E8A-4147-A177-3AD203B41FA5}">
+                      <a16:colId xmlns:a16="http://schemas.microsoft.com/office/drawing/2014/main" val="1929870939"/>
+                    </a:ext>
+                  </a:extLst>
+                </a:gridCol>
+                <a:gridCol w="2755426">
+                  <a:extLst>
+                    <a:ext uri="{9D8B030D-6E8A-4147-A177-3AD203B41FA5}">
+                      <a16:colId xmlns:a16="http://schemas.microsoft.com/office/drawing/2014/main" val="3855965330"/>
+                    </a:ext>
+                  </a:extLst>
+                </a:gridCol>
+              </a:tblGrid>
+              <a:tr h="877333">
+                <a:tc>
+                  <a:txBody>
+                    <a:bodyPr/>
+                    <a:lstStyle/>
+                    <a:p>
+                      <a:pPr algn="ctr"/>
+                      <a:r>
+                        <a:rPr lang="en-US" sz="2400" dirty="0"/>
+                        <a:t>Algorithm</a:t>
+                      </a:r>
+                    </a:p>
+                  </a:txBody>
+                  <a:tcPr/>
+                </a:tc>
+                <a:tc>
+                  <a:txBody>
+                    <a:bodyPr/>
+                    <a:lstStyle/>
+                    <a:p>
+                      <a:pPr algn="ctr"/>
+                      <a:r>
+                        <a:rPr lang="en-US" sz="2400" dirty="0"/>
+                        <a:t>Training Set</a:t>
+                      </a:r>
+                    </a:p>
+                  </a:txBody>
+                  <a:tcPr/>
+                </a:tc>
+                <a:tc>
+                  <a:txBody>
+                    <a:bodyPr/>
+                    <a:lstStyle/>
+                    <a:p>
+                      <a:pPr algn="ctr"/>
+                      <a:r>
+                        <a:rPr lang="en-US" sz="2400" dirty="0"/>
+                        <a:t>Validation Set</a:t>
+                      </a:r>
+                    </a:p>
+                  </a:txBody>
+                  <a:tcPr/>
+                </a:tc>
+                <a:tc>
+                  <a:txBody>
+                    <a:bodyPr/>
+                    <a:lstStyle/>
+                    <a:p>
+                      <a:pPr algn="ctr"/>
+                      <a:r>
+                        <a:rPr lang="en-US" sz="2400" dirty="0"/>
+                        <a:t>Test Set - Submission</a:t>
+                      </a:r>
+                    </a:p>
+                  </a:txBody>
+                  <a:tcPr/>
+                </a:tc>
+                <a:extLst>
+                  <a:ext uri="{0D108BD9-81ED-4DB2-BD59-A6C34878D82A}">
+                    <a16:rowId xmlns:a16="http://schemas.microsoft.com/office/drawing/2014/main" val="603204979"/>
+                  </a:ext>
+                </a:extLst>
+              </a:tr>
+              <a:tr h="837454">
+                <a:tc>
+                  <a:txBody>
+                    <a:bodyPr/>
+                    <a:lstStyle/>
+                    <a:p>
+                      <a:pPr algn="ctr"/>
+                      <a:r>
+                        <a:rPr lang="en-US" sz="2400" dirty="0"/>
+                        <a:t>Logistic Regression</a:t>
+                      </a:r>
+                    </a:p>
+                  </a:txBody>
+                  <a:tcPr anchor="ctr"/>
+                </a:tc>
+                <a:tc>
+                  <a:txBody>
+                    <a:bodyPr/>
+                    <a:lstStyle/>
+                    <a:p>
+                      <a:pPr algn="ctr"/>
+                      <a:r>
+                        <a:rPr lang="en-US" sz="2400" dirty="0">
+                          <a:latin typeface="Century Gothic" charset="0"/>
+                        </a:rPr>
+                        <a:t>0.41070</a:t>
+                      </a:r>
+                    </a:p>
+                  </a:txBody>
+                  <a:tcPr anchor="ctr"/>
+                </a:tc>
+                <a:tc>
+                  <a:txBody>
+                    <a:bodyPr/>
+                    <a:lstStyle/>
+                    <a:p>
+                      <a:pPr algn="ctr"/>
+                      <a:r>
+                        <a:rPr lang="en-US" sz="2400" dirty="0">
+                          <a:latin typeface="Century Gothic" charset="0"/>
+                        </a:rPr>
+                        <a:t>0.40328</a:t>
+                      </a:r>
+                    </a:p>
+                  </a:txBody>
+                  <a:tcPr anchor="ctr"/>
+                </a:tc>
+                <a:tc>
+                  <a:txBody>
+                    <a:bodyPr/>
+                    <a:lstStyle/>
+                    <a:p>
+                      <a:pPr algn="ctr"/>
+                      <a:r>
+                        <a:rPr lang="en-US" sz="2400" dirty="0">
+                          <a:latin typeface="Century Gothic" charset="0"/>
+                        </a:rPr>
+                        <a:t>0.56916</a:t>
+                      </a:r>
+                    </a:p>
+                  </a:txBody>
+                  <a:tcPr anchor="ctr"/>
+                </a:tc>
+                <a:extLst>
+                  <a:ext uri="{0D108BD9-81ED-4DB2-BD59-A6C34878D82A}">
+                    <a16:rowId xmlns:a16="http://schemas.microsoft.com/office/drawing/2014/main" val="171481581"/>
+                  </a:ext>
+                </a:extLst>
+              </a:tr>
+              <a:tr h="837454">
+                <a:tc>
+                  <a:txBody>
+                    <a:bodyPr/>
+                    <a:lstStyle/>
+                    <a:p>
+                      <a:pPr algn="ctr"/>
+                      <a:r>
+                        <a:rPr lang="en-US" sz="2400" dirty="0"/>
+                        <a:t>Decision Trees</a:t>
+                      </a:r>
+                    </a:p>
+                  </a:txBody>
+                  <a:tcPr anchor="ctr"/>
+                </a:tc>
+                <a:tc>
+                  <a:txBody>
+                    <a:bodyPr/>
+                    <a:lstStyle/>
+                    <a:p>
+                      <a:pPr algn="ctr"/>
+                      <a:r>
+                        <a:rPr lang="en-US" sz="2400" dirty="0">
+                          <a:latin typeface="Century Gothic" charset="0"/>
+                        </a:rPr>
+                        <a:t>0.44590</a:t>
+                      </a:r>
+                    </a:p>
+                  </a:txBody>
+                  <a:tcPr anchor="ctr"/>
+                </a:tc>
+                <a:tc>
+                  <a:txBody>
+                    <a:bodyPr/>
+                    <a:lstStyle/>
+                    <a:p>
+                      <a:pPr algn="ctr"/>
+                      <a:r>
+                        <a:rPr lang="en-US" sz="2400" dirty="0">
+                          <a:latin typeface="Century Gothic" charset="0"/>
+                        </a:rPr>
+                        <a:t>0.43875</a:t>
+                      </a:r>
+                    </a:p>
+                  </a:txBody>
+                  <a:tcPr anchor="ctr"/>
+                </a:tc>
+                <a:tc>
+                  <a:txBody>
+                    <a:bodyPr/>
+                    <a:lstStyle/>
+                    <a:p>
+                      <a:pPr algn="ctr"/>
+                      <a:r>
+                        <a:rPr lang="en-US" sz="2400" dirty="0">
+                          <a:latin typeface="Century Gothic" charset="0"/>
+                        </a:rPr>
+                        <a:t>0.51726</a:t>
+                      </a:r>
+                    </a:p>
+                  </a:txBody>
+                  <a:tcPr anchor="ctr"/>
+                </a:tc>
+                <a:extLst>
+                  <a:ext uri="{0D108BD9-81ED-4DB2-BD59-A6C34878D82A}">
+                    <a16:rowId xmlns:a16="http://schemas.microsoft.com/office/drawing/2014/main" val="3278033118"/>
+                  </a:ext>
+                </a:extLst>
+              </a:tr>
+              <a:tr h="837454">
+                <a:tc>
+                  <a:txBody>
+                    <a:bodyPr/>
+                    <a:lstStyle/>
+                    <a:p>
+                      <a:pPr algn="ctr"/>
+                      <a:r>
+                        <a:rPr lang="en-US" sz="2400" dirty="0"/>
+                        <a:t>Support Vector Machines</a:t>
+                      </a:r>
+                    </a:p>
+                  </a:txBody>
+                  <a:tcPr anchor="ctr"/>
+                </a:tc>
+                <a:tc>
+                  <a:txBody>
+                    <a:bodyPr/>
+                    <a:lstStyle/>
+                    <a:p>
+                      <a:pPr algn="ctr"/>
+                      <a:r>
+                        <a:rPr lang="en-US" sz="2400" dirty="0">
+                          <a:latin typeface="Century Gothic" charset="0"/>
+                        </a:rPr>
+                        <a:t>0.55027</a:t>
+                      </a:r>
+                    </a:p>
+                  </a:txBody>
+                  <a:tcPr anchor="ctr"/>
+                </a:tc>
+                <a:tc>
+                  <a:txBody>
+                    <a:bodyPr/>
+                    <a:lstStyle/>
+                    <a:p>
+                      <a:pPr algn="ctr"/>
+                      <a:r>
+                        <a:rPr lang="en-US" sz="2400" dirty="0">
+                          <a:latin typeface="Century Gothic" charset="0"/>
+                        </a:rPr>
+                        <a:t>0.54168</a:t>
+                      </a:r>
+                    </a:p>
+                  </a:txBody>
+                  <a:tcPr anchor="ctr"/>
+                </a:tc>
+                <a:tc>
+                  <a:txBody>
+                    <a:bodyPr/>
+                    <a:lstStyle/>
+                    <a:p>
+                      <a:pPr algn="ctr"/>
+                      <a:r>
+                        <a:rPr lang="en-US" sz="2400" dirty="0">
+                          <a:latin typeface="Century Gothic" charset="0"/>
+                        </a:rPr>
+                        <a:t>0.55214</a:t>
+                      </a:r>
+                    </a:p>
+                  </a:txBody>
+                  <a:tcPr anchor="ctr"/>
+                </a:tc>
+                <a:extLst>
+                  <a:ext uri="{0D108BD9-81ED-4DB2-BD59-A6C34878D82A}">
+                    <a16:rowId xmlns:a16="http://schemas.microsoft.com/office/drawing/2014/main" val="2449389249"/>
+                  </a:ext>
+                </a:extLst>
+              </a:tr>
+              <a:tr h="837454">
+                <a:tc>
+                  <a:txBody>
+                    <a:bodyPr/>
+                    <a:lstStyle/>
+                    <a:p>
+                      <a:pPr algn="ctr"/>
+                      <a:r>
+                        <a:rPr lang="en-US" sz="2400" dirty="0"/>
+                        <a:t>Random Forest Classifier</a:t>
+                      </a:r>
+                    </a:p>
+                  </a:txBody>
+                  <a:tcPr anchor="ctr"/>
+                </a:tc>
+                <a:tc>
+                  <a:txBody>
+                    <a:bodyPr/>
+                    <a:lstStyle/>
+                    <a:p>
+                      <a:pPr algn="ctr"/>
+                      <a:r>
+                        <a:rPr lang="en-US" sz="2400" dirty="0">
+                          <a:latin typeface="Century Gothic" charset="0"/>
+                        </a:rPr>
+                        <a:t>0.43844</a:t>
+                      </a:r>
+                    </a:p>
+                  </a:txBody>
+                  <a:tcPr anchor="ctr"/>
+                </a:tc>
+                <a:tc>
+                  <a:txBody>
+                    <a:bodyPr/>
+                    <a:lstStyle/>
+                    <a:p>
+                      <a:pPr algn="ctr"/>
+                      <a:r>
+                        <a:rPr lang="en-US" sz="2400" dirty="0">
+                          <a:latin typeface="Century Gothic" charset="0"/>
+                        </a:rPr>
+                        <a:t>0.45468</a:t>
+                      </a:r>
+                    </a:p>
+                  </a:txBody>
+                  <a:tcPr anchor="ctr"/>
+                </a:tc>
+                <a:tc>
+                  <a:txBody>
+                    <a:bodyPr/>
+                    <a:lstStyle/>
+                    <a:p>
+                      <a:pPr algn="ctr"/>
+                      <a:r>
+                        <a:rPr lang="en-US" sz="2400" dirty="0">
+                          <a:latin typeface="Century Gothic" charset="0"/>
+                        </a:rPr>
+                        <a:t>0.49881</a:t>
+                      </a:r>
+                    </a:p>
+                  </a:txBody>
+                  <a:tcPr anchor="ctr"/>
+                </a:tc>
+                <a:extLst>
+                  <a:ext uri="{0D108BD9-81ED-4DB2-BD59-A6C34878D82A}">
+                    <a16:rowId xmlns:a16="http://schemas.microsoft.com/office/drawing/2014/main" val="2152659227"/>
+                  </a:ext>
+                </a:extLst>
+              </a:tr>
+            </a:tbl>
+          </a:graphicData>
+        </a:graphic>
+      </p:graphicFrame>
+    </p:spTree>
+    <p:extLst>
+      <p:ext uri="{BB962C8B-B14F-4D97-AF65-F5344CB8AC3E}">
+        <p14:creationId xmlns:p14="http://schemas.microsoft.com/office/powerpoint/2010/main" val="187502220"/>
+      </p:ext>
+    </p:extLst>
+  </p:cSld>
+  <p:clrMapOvr>
+    <a:masterClrMapping/>
+  </p:clrMapOvr>
+</p:sld>
+</file>
+
+<file path=ppt/slides/slide9.xml><?xml version="1.0" encoding="utf-8"?>
+<p:sld xmlns:a="http://schemas.openxmlformats.org/drawingml/2006/main" xmlns:r="http://schemas.openxmlformats.org/officeDocument/2006/relationships" xmlns:p="http://schemas.openxmlformats.org/presentationml/2006/main">
+  <p:cSld>
+    <p:spTree>
+      <p:nvGrpSpPr>
+        <p:cNvPr id="1" name=""/>
+        <p:cNvGrpSpPr/>
+        <p:nvPr/>
+      </p:nvGrpSpPr>
+      <p:grpSpPr>
+        <a:xfrm>
+          <a:off x="0" y="0"/>
+          <a:ext cx="0" cy="0"/>
+          <a:chOff x="0" y="0"/>
+          <a:chExt cx="0" cy="0"/>
+        </a:xfrm>
+      </p:grpSpPr>
+      <p:sp>
+        <p:nvSpPr>
+          <p:cNvPr id="2" name="Title 1"/>
+          <p:cNvSpPr>
+            <a:spLocks noGrp="1"/>
+          </p:cNvSpPr>
+          <p:nvPr>
+            <p:ph type="title"/>
+          </p:nvPr>
+        </p:nvSpPr>
+        <p:spPr/>
+        <p:txBody>
+          <a:bodyPr/>
+          <a:lstStyle/>
+          <a:p>
+            <a:r>
+              <a:rPr lang="en-US" dirty="0"/>
               <a:t>conclusion</a:t>
             </a:r>
-            <a:endParaRPr lang="en-US" dirty="0"/>
           </a:p>
         </p:txBody>
       </p:sp>
@@ -7072,12 +8161,38 @@
             <p:ph idx="1"/>
           </p:nvPr>
         </p:nvSpPr>
-        <p:spPr/>
+        <p:spPr>
+          <a:xfrm>
+            <a:off x="1141413" y="2269625"/>
+            <a:ext cx="9906000" cy="3521575"/>
+          </a:xfrm>
+        </p:spPr>
         <p:txBody>
           <a:bodyPr/>
           <a:lstStyle/>
           <a:p>
-            <a:endParaRPr lang="en-US" dirty="0"/>
+            <a:r>
+              <a:rPr lang="en-US" sz="3600" dirty="0"/>
+              <a:t>Anonymization added to the challenge</a:t>
+            </a:r>
+          </a:p>
+          <a:p>
+            <a:r>
+              <a:rPr lang="en-US" sz="3600" dirty="0"/>
+              <a:t>Models Prone to overfitting</a:t>
+            </a:r>
+          </a:p>
+          <a:p>
+            <a:r>
+              <a:rPr lang="en-US" sz="3600" dirty="0"/>
+              <a:t>Feature Extraction key to Success</a:t>
+            </a:r>
+          </a:p>
+          <a:p>
+            <a:r>
+              <a:rPr lang="en-US" sz="3600" dirty="0"/>
+              <a:t>Feature Importance builds on top of good Feature Extraction</a:t>
+            </a:r>
           </a:p>
         </p:txBody>
       </p:sp>
@@ -7091,13 +8206,6 @@
   <p:clrMapOvr>
     <a:masterClrMapping/>
   </p:clrMapOvr>
-  <p:timing>
-    <p:tnLst>
-      <p:par>
-        <p:cTn id="1" dur="indefinite" restart="never" nodeType="tmRoot"/>
-      </p:par>
-    </p:tnLst>
-  </p:timing>
 </p:sld>
 </file>
 

</xml_diff>